<commit_message>
Modified parser. Make presentation changes
</commit_message>
<xml_diff>
--- a/presentation/Moiseyenko_presentation_cut.pptx
+++ b/presentation/Moiseyenko_presentation_cut.pptx
@@ -5,7 +5,7 @@
     <p:sldMasterId id="2147485548" r:id="rId1"/>
   </p:sldMasterIdLst>
   <p:notesMasterIdLst>
-    <p:notesMasterId r:id="rId15"/>
+    <p:notesMasterId r:id="rId11"/>
   </p:notesMasterIdLst>
   <p:sldIdLst>
     <p:sldId id="256" r:id="rId2"/>
@@ -13,14 +13,10 @@
     <p:sldId id="261" r:id="rId4"/>
     <p:sldId id="262" r:id="rId5"/>
     <p:sldId id="266" r:id="rId6"/>
-    <p:sldId id="284" r:id="rId7"/>
+    <p:sldId id="269" r:id="rId7"/>
     <p:sldId id="267" r:id="rId8"/>
-    <p:sldId id="272" r:id="rId9"/>
-    <p:sldId id="269" r:id="rId10"/>
-    <p:sldId id="276" r:id="rId11"/>
-    <p:sldId id="282" r:id="rId12"/>
-    <p:sldId id="283" r:id="rId13"/>
-    <p:sldId id="278" r:id="rId14"/>
+    <p:sldId id="276" r:id="rId9"/>
+    <p:sldId id="278" r:id="rId10"/>
   </p:sldIdLst>
   <p:sldSz cx="9144000" cy="6858000" type="screen4x3"/>
   <p:notesSz cx="6858000" cy="9144000"/>
@@ -4209,49 +4205,97 @@
           <a:p>
             <a:pPr algn="ctr"/>
             <a:r>
-              <a:rPr lang="ru-RU" sz="4000" b="1" dirty="0"/>
+              <a:rPr lang="ru-RU" sz="4000" b="1" dirty="0">
+                <a:latin typeface="Tahoma" charset="0"/>
+                <a:ea typeface="Tahoma" charset="0"/>
+                <a:cs typeface="Tahoma" charset="0"/>
+              </a:rPr>
               <a:t>РАЗРАБОТКА ПРОГРАММНОГО ОБЕСПЕЧЕНИЯ </a:t>
             </a:r>
             <a:r>
-              <a:rPr lang="en-US" sz="4000" b="1" dirty="0" smtClean="0"/>
+              <a:rPr lang="en-US" sz="4000" b="1" dirty="0" smtClean="0">
+                <a:latin typeface="Tahoma" charset="0"/>
+                <a:ea typeface="Tahoma" charset="0"/>
+                <a:cs typeface="Tahoma" charset="0"/>
+              </a:rPr>
               <a:t/>
             </a:r>
             <a:br>
-              <a:rPr lang="en-US" sz="4000" b="1" dirty="0" smtClean="0"/>
+              <a:rPr lang="en-US" sz="4000" b="1" dirty="0" smtClean="0">
+                <a:latin typeface="Tahoma" charset="0"/>
+                <a:ea typeface="Tahoma" charset="0"/>
+                <a:cs typeface="Tahoma" charset="0"/>
+              </a:rPr>
             </a:br>
             <a:r>
-              <a:rPr lang="ru-RU" sz="4000" b="1" dirty="0" smtClean="0"/>
+              <a:rPr lang="ru-RU" sz="4000" b="1" dirty="0" smtClean="0">
+                <a:latin typeface="Tahoma" charset="0"/>
+                <a:ea typeface="Tahoma" charset="0"/>
+                <a:cs typeface="Tahoma" charset="0"/>
+              </a:rPr>
               <a:t>ДЛЯ ПАРСИНГА</a:t>
             </a:r>
             <a:r>
-              <a:rPr lang="en-US" sz="4000" b="1" dirty="0" smtClean="0"/>
+              <a:rPr lang="en-US" sz="4000" b="1" dirty="0" smtClean="0">
+                <a:latin typeface="Tahoma" charset="0"/>
+                <a:ea typeface="Tahoma" charset="0"/>
+                <a:cs typeface="Tahoma" charset="0"/>
+              </a:rPr>
               <a:t> </a:t>
             </a:r>
             <a:r>
-              <a:rPr lang="ru-RU" sz="4000" b="1" dirty="0" smtClean="0"/>
+              <a:rPr lang="ru-RU" sz="4000" b="1" dirty="0" smtClean="0">
+                <a:latin typeface="Tahoma" charset="0"/>
+                <a:ea typeface="Tahoma" charset="0"/>
+                <a:cs typeface="Tahoma" charset="0"/>
+              </a:rPr>
               <a:t>ТЕКСТОВ </a:t>
             </a:r>
             <a:br>
-              <a:rPr lang="ru-RU" sz="4000" b="1" dirty="0" smtClean="0"/>
+              <a:rPr lang="ru-RU" sz="4000" b="1" dirty="0" smtClean="0">
+                <a:latin typeface="Tahoma" charset="0"/>
+                <a:ea typeface="Tahoma" charset="0"/>
+                <a:cs typeface="Tahoma" charset="0"/>
+              </a:rPr>
             </a:br>
             <a:r>
-              <a:rPr lang="ru-RU" sz="4000" b="1" dirty="0" smtClean="0"/>
+              <a:rPr lang="ru-RU" sz="4000" b="1" dirty="0" smtClean="0">
+                <a:latin typeface="Tahoma" charset="0"/>
+                <a:ea typeface="Tahoma" charset="0"/>
+                <a:cs typeface="Tahoma" charset="0"/>
+              </a:rPr>
               <a:t>И</a:t>
             </a:r>
             <a:r>
-              <a:rPr lang="en-US" sz="4000" dirty="0" smtClean="0"/>
+              <a:rPr lang="en-US" sz="4000" dirty="0" smtClean="0">
+                <a:latin typeface="Tahoma" charset="0"/>
+                <a:ea typeface="Tahoma" charset="0"/>
+                <a:cs typeface="Tahoma" charset="0"/>
+              </a:rPr>
               <a:t> </a:t>
             </a:r>
             <a:r>
-              <a:rPr lang="ru-RU" sz="4000" b="1" dirty="0" smtClean="0"/>
+              <a:rPr lang="ru-RU" sz="4000" b="1" dirty="0" smtClean="0">
+                <a:latin typeface="Tahoma" charset="0"/>
+                <a:ea typeface="Tahoma" charset="0"/>
+                <a:cs typeface="Tahoma" charset="0"/>
+              </a:rPr>
               <a:t>ГЕНЕРАЦИИ </a:t>
             </a:r>
             <a:r>
-              <a:rPr lang="ru-RU" sz="4000" b="1" dirty="0"/>
+              <a:rPr lang="ru-RU" sz="4000" b="1" dirty="0">
+                <a:latin typeface="Tahoma" charset="0"/>
+                <a:ea typeface="Tahoma" charset="0"/>
+                <a:cs typeface="Tahoma" charset="0"/>
+              </a:rPr>
               <a:t>UML МОДЕЛЕЙ</a:t>
             </a:r>
             <a:r>
-              <a:rPr lang="ru-RU" sz="4000" dirty="0"/>
+              <a:rPr lang="ru-RU" sz="4000" dirty="0">
+                <a:latin typeface="Tahoma" charset="0"/>
+                <a:ea typeface="Tahoma" charset="0"/>
+                <a:cs typeface="Tahoma" charset="0"/>
+              </a:rPr>
               <a:t> </a:t>
             </a:r>
           </a:p>
@@ -4265,8 +4309,8 @@
         </p:nvSpPr>
         <p:spPr>
           <a:xfrm>
-            <a:off x="3034145" y="5721744"/>
-            <a:ext cx="5444837" cy="369332"/>
+            <a:off x="3034146" y="5721744"/>
+            <a:ext cx="5306292" cy="369332"/>
           </a:xfrm>
           <a:prstGeom prst="rect">
             <a:avLst/>
@@ -4279,16 +4323,29 @@
           </a:bodyPr>
           <a:lstStyle/>
           <a:p>
-            <a:r>
-              <a:rPr lang="ru-RU" altLang="x-none" dirty="0"/>
+            <a:pPr algn="r"/>
+            <a:r>
+              <a:rPr lang="ru-RU" altLang="x-none" dirty="0">
+                <a:latin typeface="Tahoma" charset="0"/>
+                <a:ea typeface="Tahoma" charset="0"/>
+                <a:cs typeface="Tahoma" charset="0"/>
+              </a:rPr>
               <a:t>руководитель: доц. </a:t>
             </a:r>
             <a:r>
-              <a:rPr lang="ru-RU" altLang="x-none" dirty="0" smtClean="0"/>
+              <a:rPr lang="ru-RU" altLang="x-none" dirty="0" smtClean="0">
+                <a:latin typeface="Tahoma" charset="0"/>
+                <a:ea typeface="Tahoma" charset="0"/>
+                <a:cs typeface="Tahoma" charset="0"/>
+              </a:rPr>
               <a:t>В.А</a:t>
             </a:r>
             <a:r>
-              <a:rPr lang="ru-RU" altLang="x-none" dirty="0"/>
+              <a:rPr lang="ru-RU" altLang="x-none" dirty="0">
+                <a:latin typeface="Tahoma" charset="0"/>
+                <a:ea typeface="Tahoma" charset="0"/>
+                <a:cs typeface="Tahoma" charset="0"/>
+              </a:rPr>
               <a:t>. Ермолаев</a:t>
             </a:r>
           </a:p>
@@ -4303,7 +4360,7 @@
         <p:spPr>
           <a:xfrm>
             <a:off x="3034145" y="5352412"/>
-            <a:ext cx="5444836" cy="369332"/>
+            <a:ext cx="5306292" cy="369332"/>
           </a:xfrm>
           <a:prstGeom prst="rect">
             <a:avLst/>
@@ -4316,23 +4373,44 @@
           </a:bodyPr>
           <a:lstStyle/>
           <a:p>
-            <a:r>
-              <a:rPr lang="ru-RU" altLang="x-none" dirty="0" smtClean="0"/>
-              <a:t>выполнила: Моисеенко Светлана, </a:t>
-            </a:r>
-            <a:r>
-              <a:rPr lang="ru-RU" altLang="x-none" dirty="0"/>
-              <a:t>гр. </a:t>
-            </a:r>
-            <a:r>
-              <a:rPr lang="uk-UA" dirty="0"/>
-              <a:t>7.1226-з</a:t>
-            </a:r>
-            <a:r>
-              <a:rPr lang="en-US" dirty="0"/>
+            <a:pPr algn="r"/>
+            <a:r>
+              <a:rPr lang="ru-RU" altLang="x-none" dirty="0" smtClean="0">
+                <a:latin typeface="Tahoma" charset="0"/>
+                <a:ea typeface="Tahoma" charset="0"/>
+                <a:cs typeface="Tahoma" charset="0"/>
+              </a:rPr>
+              <a:t>выполнила: </a:t>
+            </a:r>
+            <a:r>
+              <a:rPr lang="en-US" altLang="x-none" dirty="0" smtClean="0">
+                <a:latin typeface="Tahoma" charset="0"/>
+                <a:ea typeface="Tahoma" charset="0"/>
+                <a:cs typeface="Tahoma" charset="0"/>
+              </a:rPr>
+              <a:t>C.A. </a:t>
+            </a:r>
+            <a:r>
+              <a:rPr lang="ru-RU" altLang="x-none" dirty="0" smtClean="0">
+                <a:latin typeface="Tahoma" charset="0"/>
+                <a:ea typeface="Tahoma" charset="0"/>
+                <a:cs typeface="Tahoma" charset="0"/>
+              </a:rPr>
+              <a:t>Моисеенко</a:t>
+            </a:r>
+            <a:r>
+              <a:rPr lang="en-US" altLang="x-none" dirty="0" smtClean="0">
+                <a:latin typeface="Tahoma" charset="0"/>
+                <a:ea typeface="Tahoma" charset="0"/>
+                <a:cs typeface="Tahoma" charset="0"/>
+              </a:rPr>
               <a:t> </a:t>
             </a:r>
-            <a:endParaRPr lang="ru-RU" dirty="0" smtClean="0"/>
+            <a:endParaRPr lang="ru-RU" dirty="0" smtClean="0">
+              <a:latin typeface="Tahoma" charset="0"/>
+              <a:ea typeface="Tahoma" charset="0"/>
+              <a:cs typeface="Tahoma" charset="0"/>
+            </a:endParaRPr>
           </a:p>
         </p:txBody>
       </p:sp>
@@ -4340,832 +4418,6 @@
     <p:extLst>
       <p:ext uri="{BB962C8B-B14F-4D97-AF65-F5344CB8AC3E}">
         <p14:creationId xmlns:p14="http://schemas.microsoft.com/office/powerpoint/2010/main" val="1530003194"/>
-      </p:ext>
-    </p:extLst>
-  </p:cSld>
-  <p:clrMapOvr>
-    <a:masterClrMapping/>
-  </p:clrMapOvr>
-  <p:timing>
-    <p:tnLst>
-      <p:par>
-        <p:cTn id="1" dur="indefinite" restart="never" nodeType="tmRoot"/>
-      </p:par>
-    </p:tnLst>
-  </p:timing>
-</p:sld>
-</file>
-
-<file path=ppt/slides/slide10.xml><?xml version="1.0" encoding="utf-8"?>
-<p:sld xmlns:a="http://schemas.openxmlformats.org/drawingml/2006/main" xmlns:r="http://schemas.openxmlformats.org/officeDocument/2006/relationships" xmlns:p="http://schemas.openxmlformats.org/presentationml/2006/main">
-  <p:cSld>
-    <p:spTree>
-      <p:nvGrpSpPr>
-        <p:cNvPr id="1" name=""/>
-        <p:cNvGrpSpPr/>
-        <p:nvPr/>
-      </p:nvGrpSpPr>
-      <p:grpSpPr>
-        <a:xfrm>
-          <a:off x="0" y="0"/>
-          <a:ext cx="0" cy="0"/>
-          <a:chOff x="0" y="0"/>
-          <a:chExt cx="0" cy="0"/>
-        </a:xfrm>
-      </p:grpSpPr>
-      <p:pic>
-        <p:nvPicPr>
-          <p:cNvPr id="4" name="officeArt object"/>
-          <p:cNvPicPr>
-            <a:picLocks noGrp="1"/>
-          </p:cNvPicPr>
-          <p:nvPr>
-            <p:ph idx="1"/>
-          </p:nvPr>
-        </p:nvPicPr>
-        <p:blipFill>
-          <a:blip r:embed="rId2">
-            <a:extLst/>
-          </a:blip>
-          <a:stretch>
-            <a:fillRect/>
-          </a:stretch>
-        </p:blipFill>
-        <p:spPr>
-          <a:xfrm>
-            <a:off x="946150" y="2177865"/>
-            <a:ext cx="6446838" cy="3653208"/>
-          </a:xfrm>
-          <a:prstGeom prst="rect">
-            <a:avLst/>
-          </a:prstGeom>
-          <a:ln w="12700" cap="flat">
-            <a:noFill/>
-            <a:miter lim="400000"/>
-          </a:ln>
-          <a:effectLst/>
-        </p:spPr>
-      </p:pic>
-      <p:sp>
-        <p:nvSpPr>
-          <p:cNvPr id="5" name="TextBox 4"/>
-          <p:cNvSpPr txBox="1"/>
-          <p:nvPr/>
-        </p:nvSpPr>
-        <p:spPr>
-          <a:xfrm>
-            <a:off x="585158" y="293831"/>
-            <a:ext cx="6807830" cy="954107"/>
-          </a:xfrm>
-          <a:prstGeom prst="rect">
-            <a:avLst/>
-          </a:prstGeom>
-          <a:noFill/>
-        </p:spPr>
-        <p:txBody>
-          <a:bodyPr wrap="square" rtlCol="0">
-            <a:spAutoFit/>
-          </a:bodyPr>
-          <a:lstStyle/>
-          <a:p>
-            <a:r>
-              <a:rPr lang="ru-RU" sz="2800" b="1" dirty="0">
-                <a:solidFill>
-                  <a:schemeClr val="accent1"/>
-                </a:solidFill>
-              </a:rPr>
-              <a:t>Текст с орфографическими и синтаксическими ошибками</a:t>
-            </a:r>
-            <a:endParaRPr lang="en-US" sz="2800" b="1" dirty="0">
-              <a:solidFill>
-                <a:schemeClr val="accent1"/>
-              </a:solidFill>
-            </a:endParaRPr>
-          </a:p>
-        </p:txBody>
-      </p:sp>
-    </p:spTree>
-    <p:extLst>
-      <p:ext uri="{BB962C8B-B14F-4D97-AF65-F5344CB8AC3E}">
-        <p14:creationId xmlns:p14="http://schemas.microsoft.com/office/powerpoint/2010/main" val="271638538"/>
-      </p:ext>
-    </p:extLst>
-  </p:cSld>
-  <p:clrMapOvr>
-    <a:masterClrMapping/>
-  </p:clrMapOvr>
-  <p:timing>
-    <p:tnLst>
-      <p:par>
-        <p:cTn id="1" dur="indefinite" restart="never" nodeType="tmRoot"/>
-      </p:par>
-    </p:tnLst>
-  </p:timing>
-</p:sld>
-</file>
-
-<file path=ppt/slides/slide11.xml><?xml version="1.0" encoding="utf-8"?>
-<p:sld xmlns:a="http://schemas.openxmlformats.org/drawingml/2006/main" xmlns:r="http://schemas.openxmlformats.org/officeDocument/2006/relationships" xmlns:p="http://schemas.openxmlformats.org/presentationml/2006/main">
-  <p:cSld>
-    <p:spTree>
-      <p:nvGrpSpPr>
-        <p:cNvPr id="1" name=""/>
-        <p:cNvGrpSpPr/>
-        <p:nvPr/>
-      </p:nvGrpSpPr>
-      <p:grpSpPr>
-        <a:xfrm>
-          <a:off x="0" y="0"/>
-          <a:ext cx="0" cy="0"/>
-          <a:chOff x="0" y="0"/>
-          <a:chExt cx="0" cy="0"/>
-        </a:xfrm>
-      </p:grpSpPr>
-      <p:sp>
-        <p:nvSpPr>
-          <p:cNvPr id="2" name="Title 1"/>
-          <p:cNvSpPr>
-            <a:spLocks noGrp="1"/>
-          </p:cNvSpPr>
-          <p:nvPr>
-            <p:ph type="title"/>
-          </p:nvPr>
-        </p:nvSpPr>
-        <p:spPr>
-          <a:xfrm>
-            <a:off x="946404" y="1054045"/>
-            <a:ext cx="7269480" cy="977378"/>
-          </a:xfrm>
-        </p:spPr>
-        <p:txBody>
-          <a:bodyPr>
-            <a:normAutofit fontScale="90000"/>
-          </a:bodyPr>
-          <a:lstStyle/>
-          <a:p>
-            <a:r>
-              <a:rPr lang="ru-RU" dirty="0"/>
-              <a:t>Преимущества</a:t>
-            </a:r>
-            <a:r>
-              <a:rPr lang="en-US" dirty="0"/>
-              <a:t/>
-            </a:r>
-            <a:br>
-              <a:rPr lang="en-US" dirty="0"/>
-            </a:br>
-            <a:endParaRPr lang="en-US" dirty="0"/>
-          </a:p>
-        </p:txBody>
-      </p:sp>
-      <p:sp>
-        <p:nvSpPr>
-          <p:cNvPr id="3" name="Content Placeholder 2"/>
-          <p:cNvSpPr>
-            <a:spLocks noGrp="1"/>
-          </p:cNvSpPr>
-          <p:nvPr>
-            <p:ph idx="1"/>
-          </p:nvPr>
-        </p:nvSpPr>
-        <p:spPr>
-          <a:xfrm>
-            <a:off x="946404" y="2239241"/>
-            <a:ext cx="6898733" cy="2524991"/>
-          </a:xfrm>
-        </p:spPr>
-        <p:txBody>
-          <a:bodyPr>
-            <a:normAutofit fontScale="92500" lnSpcReduction="10000"/>
-          </a:bodyPr>
-          <a:lstStyle/>
-          <a:p>
-            <a:pPr lvl="0" algn="just"/>
-            <a:r>
-              <a:rPr lang="ru-RU" dirty="0" smtClean="0"/>
-              <a:t>Применение </a:t>
-            </a:r>
-            <a:r>
-              <a:rPr lang="ru-RU" dirty="0"/>
-              <a:t>библиотеки </a:t>
-            </a:r>
-            <a:r>
-              <a:rPr lang="ru-RU" dirty="0" err="1"/>
-              <a:t>Stanford</a:t>
-            </a:r>
-            <a:r>
-              <a:rPr lang="ru-RU" dirty="0"/>
-              <a:t> </a:t>
-            </a:r>
-            <a:r>
-              <a:rPr lang="ru-RU" dirty="0" err="1"/>
-              <a:t>CoreNLP</a:t>
-            </a:r>
-            <a:r>
-              <a:rPr lang="ru-RU" dirty="0"/>
-              <a:t> дает широкие возможности выполнения различных типов </a:t>
-            </a:r>
-            <a:r>
-              <a:rPr lang="ru-RU" dirty="0" err="1"/>
-              <a:t>парсинга</a:t>
-            </a:r>
-            <a:r>
-              <a:rPr lang="ru-RU" dirty="0" smtClean="0"/>
-              <a:t>.</a:t>
-            </a:r>
-            <a:endParaRPr lang="en-US" dirty="0"/>
-          </a:p>
-          <a:p>
-            <a:pPr lvl="0" algn="just"/>
-            <a:r>
-              <a:rPr lang="ru-RU" dirty="0"/>
-              <a:t>Обработка полученного дерева через выделение основных узлов NP и VP без четкой привязки к каждому типу зависимости</a:t>
-            </a:r>
-            <a:r>
-              <a:rPr lang="ru-RU" dirty="0" smtClean="0"/>
-              <a:t>.</a:t>
-            </a:r>
-            <a:endParaRPr lang="en-US" dirty="0"/>
-          </a:p>
-          <a:p>
-            <a:pPr lvl="0" algn="just"/>
-            <a:r>
-              <a:rPr lang="ru-RU" dirty="0" smtClean="0"/>
-              <a:t>Использование</a:t>
-            </a:r>
-            <a:r>
-              <a:rPr lang="en-US" dirty="0" smtClean="0"/>
-              <a:t> </a:t>
-            </a:r>
-            <a:r>
-              <a:rPr lang="ru-RU" dirty="0" smtClean="0"/>
-              <a:t>граф</a:t>
-            </a:r>
-            <a:r>
-              <a:rPr lang="ru-RU" dirty="0"/>
-              <a:t>а</a:t>
-            </a:r>
-            <a:r>
-              <a:rPr lang="ru-RU" dirty="0" smtClean="0"/>
-              <a:t> </a:t>
-            </a:r>
-            <a:r>
-              <a:rPr lang="ru-RU" dirty="0"/>
-              <a:t>как основной структуры данных.</a:t>
-            </a:r>
-            <a:br>
-              <a:rPr lang="ru-RU" dirty="0"/>
-            </a:br>
-            <a:r>
-              <a:rPr lang="ru-RU" dirty="0"/>
-              <a:t>Быстрая обработка небольших объемов текстов</a:t>
-            </a:r>
-            <a:r>
-              <a:rPr lang="ru-RU" dirty="0" smtClean="0"/>
-              <a:t>.</a:t>
-            </a:r>
-            <a:endParaRPr lang="en-US" dirty="0"/>
-          </a:p>
-          <a:p>
-            <a:endParaRPr lang="en-US" dirty="0"/>
-          </a:p>
-        </p:txBody>
-      </p:sp>
-    </p:spTree>
-    <p:extLst>
-      <p:ext uri="{BB962C8B-B14F-4D97-AF65-F5344CB8AC3E}">
-        <p14:creationId xmlns:p14="http://schemas.microsoft.com/office/powerpoint/2010/main" val="923096641"/>
-      </p:ext>
-    </p:extLst>
-  </p:cSld>
-  <p:clrMapOvr>
-    <a:masterClrMapping/>
-  </p:clrMapOvr>
-</p:sld>
-</file>
-
-<file path=ppt/slides/slide12.xml><?xml version="1.0" encoding="utf-8"?>
-<p:sld xmlns:a="http://schemas.openxmlformats.org/drawingml/2006/main" xmlns:r="http://schemas.openxmlformats.org/officeDocument/2006/relationships" xmlns:p="http://schemas.openxmlformats.org/presentationml/2006/main">
-  <p:cSld>
-    <p:spTree>
-      <p:nvGrpSpPr>
-        <p:cNvPr id="1" name=""/>
-        <p:cNvGrpSpPr/>
-        <p:nvPr/>
-      </p:nvGrpSpPr>
-      <p:grpSpPr>
-        <a:xfrm>
-          <a:off x="0" y="0"/>
-          <a:ext cx="0" cy="0"/>
-          <a:chOff x="0" y="0"/>
-          <a:chExt cx="0" cy="0"/>
-        </a:xfrm>
-      </p:grpSpPr>
-      <p:sp>
-        <p:nvSpPr>
-          <p:cNvPr id="2" name="Title 1"/>
-          <p:cNvSpPr>
-            <a:spLocks noGrp="1"/>
-          </p:cNvSpPr>
-          <p:nvPr>
-            <p:ph type="title"/>
-          </p:nvPr>
-        </p:nvSpPr>
-        <p:spPr>
-          <a:xfrm>
-            <a:off x="946404" y="1054045"/>
-            <a:ext cx="7269480" cy="811123"/>
-          </a:xfrm>
-        </p:spPr>
-        <p:txBody>
-          <a:bodyPr>
-            <a:normAutofit fontScale="90000"/>
-          </a:bodyPr>
-          <a:lstStyle/>
-          <a:p>
-            <a:r>
-              <a:rPr lang="ru-RU" dirty="0" smtClean="0"/>
-              <a:t>Недостатки и возможности их решения</a:t>
-            </a:r>
-            <a:endParaRPr lang="en-US" dirty="0"/>
-          </a:p>
-        </p:txBody>
-      </p:sp>
-      <p:sp>
-        <p:nvSpPr>
-          <p:cNvPr id="3" name="Content Placeholder 2"/>
-          <p:cNvSpPr>
-            <a:spLocks noGrp="1"/>
-          </p:cNvSpPr>
-          <p:nvPr>
-            <p:ph idx="1"/>
-          </p:nvPr>
-        </p:nvSpPr>
-        <p:spPr>
-          <a:xfrm>
-            <a:off x="946404" y="2124941"/>
-            <a:ext cx="6929905" cy="3595255"/>
-          </a:xfrm>
-        </p:spPr>
-        <p:txBody>
-          <a:bodyPr>
-            <a:normAutofit fontScale="62500" lnSpcReduction="20000"/>
-          </a:bodyPr>
-          <a:lstStyle/>
-          <a:p>
-            <a:pPr lvl="0" algn="just"/>
-            <a:r>
-              <a:rPr lang="en-US" dirty="0"/>
-              <a:t>Stanford </a:t>
-            </a:r>
-            <a:r>
-              <a:rPr lang="en-US" dirty="0" err="1"/>
-              <a:t>CoreNLP</a:t>
-            </a:r>
-            <a:r>
-              <a:rPr lang="ru-RU" dirty="0"/>
-              <a:t> может показывать непредсказуемые результаты </a:t>
-            </a:r>
-            <a:r>
-              <a:rPr lang="ru-RU" dirty="0" err="1"/>
-              <a:t>парсинга</a:t>
-            </a:r>
-            <a:r>
-              <a:rPr lang="ru-RU" dirty="0"/>
-              <a:t>, это зависит от многих факторов например, ошибки в тексте, неправильно поставленные знаки препинания и другие</a:t>
-            </a:r>
-            <a:r>
-              <a:rPr lang="ru-RU" dirty="0" smtClean="0"/>
-              <a:t>.</a:t>
-            </a:r>
-            <a:endParaRPr lang="en-US" dirty="0"/>
-          </a:p>
-          <a:p>
-            <a:pPr lvl="0" algn="just"/>
-            <a:r>
-              <a:rPr lang="ru-RU" dirty="0"/>
-              <a:t>Так как обработка текстов  может занимать достаточно много времени. В будущем необходимо провести оптимизацию </a:t>
-            </a:r>
-            <a:r>
-              <a:rPr lang="ru-RU" dirty="0" err="1"/>
-              <a:t>парсинга</a:t>
-            </a:r>
-            <a:r>
-              <a:rPr lang="ru-RU" dirty="0"/>
-              <a:t> большого объема текстов</a:t>
-            </a:r>
-            <a:r>
-              <a:rPr lang="ru-RU" dirty="0" smtClean="0"/>
-              <a:t>.</a:t>
-            </a:r>
-            <a:endParaRPr lang="en-US" dirty="0"/>
-          </a:p>
-          <a:p>
-            <a:pPr lvl="0" algn="just"/>
-            <a:r>
-              <a:rPr lang="ru-RU" dirty="0"/>
-              <a:t>Текущий подход к конвертации дерева зависимостей между частями речи хоть и является универсальным, но не является достаточно надежным. В отдельных случаях мы можем получить достаточно непредсказуемые результаты, которые могут очень сильно отличаться от ожидаемых</a:t>
-            </a:r>
-            <a:r>
-              <a:rPr lang="ru-RU" dirty="0" smtClean="0"/>
-              <a:t>.</a:t>
-            </a:r>
-            <a:endParaRPr lang="en-US" dirty="0"/>
-          </a:p>
-          <a:p>
-            <a:pPr lvl="0" algn="just"/>
-            <a:r>
-              <a:rPr lang="ru-RU" dirty="0"/>
-              <a:t>В настоящее время до сих пор не существует четких правил конвертации текста, поэтому довольно трудно вывести успешную формулу для конвертации естественного языка в </a:t>
-            </a:r>
-            <a:r>
-              <a:rPr lang="en-US" dirty="0"/>
-              <a:t>UML</a:t>
-            </a:r>
-            <a:r>
-              <a:rPr lang="ru-RU" dirty="0"/>
-              <a:t> диаграммы</a:t>
-            </a:r>
-            <a:r>
-              <a:rPr lang="ru-RU" dirty="0" smtClean="0"/>
-              <a:t>.</a:t>
-            </a:r>
-            <a:endParaRPr lang="en-US" dirty="0"/>
-          </a:p>
-          <a:p>
-            <a:pPr lvl="0" algn="just"/>
-            <a:r>
-              <a:rPr lang="ru-RU" dirty="0"/>
-              <a:t>Очень большая зависимость от результатов </a:t>
-            </a:r>
-            <a:r>
-              <a:rPr lang="ru-RU" dirty="0" err="1"/>
-              <a:t>парсинга</a:t>
-            </a:r>
-            <a:r>
-              <a:rPr lang="ru-RU" dirty="0"/>
-              <a:t> </a:t>
-            </a:r>
-            <a:r>
-              <a:rPr lang="en-US" dirty="0" err="1"/>
-              <a:t>Stanfrod</a:t>
-            </a:r>
-            <a:r>
-              <a:rPr lang="en-US" dirty="0"/>
-              <a:t> Core NLP</a:t>
-            </a:r>
-            <a:r>
-              <a:rPr lang="ru-RU" dirty="0"/>
-              <a:t>. В будущем можно рассмотреть альтернативное или комплексное решение (например, использование дополнительных библиотек или оптимизацию </a:t>
-            </a:r>
-            <a:r>
-              <a:rPr lang="en-US" dirty="0"/>
-              <a:t>Core NLP)</a:t>
-            </a:r>
-          </a:p>
-          <a:p>
-            <a:endParaRPr lang="en-US" dirty="0"/>
-          </a:p>
-        </p:txBody>
-      </p:sp>
-    </p:spTree>
-    <p:extLst>
-      <p:ext uri="{BB962C8B-B14F-4D97-AF65-F5344CB8AC3E}">
-        <p14:creationId xmlns:p14="http://schemas.microsoft.com/office/powerpoint/2010/main" val="2077263680"/>
-      </p:ext>
-    </p:extLst>
-  </p:cSld>
-  <p:clrMapOvr>
-    <a:masterClrMapping/>
-  </p:clrMapOvr>
-</p:sld>
-</file>
-
-<file path=ppt/slides/slide13.xml><?xml version="1.0" encoding="utf-8"?>
-<p:sld xmlns:a="http://schemas.openxmlformats.org/drawingml/2006/main" xmlns:r="http://schemas.openxmlformats.org/officeDocument/2006/relationships" xmlns:p="http://schemas.openxmlformats.org/presentationml/2006/main">
-  <p:cSld>
-    <p:spTree>
-      <p:nvGrpSpPr>
-        <p:cNvPr id="1" name=""/>
-        <p:cNvGrpSpPr/>
-        <p:nvPr/>
-      </p:nvGrpSpPr>
-      <p:grpSpPr>
-        <a:xfrm>
-          <a:off x="0" y="0"/>
-          <a:ext cx="0" cy="0"/>
-          <a:chOff x="0" y="0"/>
-          <a:chExt cx="0" cy="0"/>
-        </a:xfrm>
-      </p:grpSpPr>
-      <p:sp>
-        <p:nvSpPr>
-          <p:cNvPr id="2" name="Title 1"/>
-          <p:cNvSpPr>
-            <a:spLocks noGrp="1"/>
-          </p:cNvSpPr>
-          <p:nvPr>
-            <p:ph type="title"/>
-          </p:nvPr>
-        </p:nvSpPr>
-        <p:spPr>
-          <a:xfrm>
-            <a:off x="647700" y="1077898"/>
-            <a:ext cx="7568184" cy="541352"/>
-          </a:xfrm>
-        </p:spPr>
-        <p:txBody>
-          <a:bodyPr>
-            <a:normAutofit fontScale="90000"/>
-          </a:bodyPr>
-          <a:lstStyle/>
-          <a:p>
-            <a:r>
-              <a:rPr lang="ru-RU" dirty="0" smtClean="0"/>
-              <a:t>Вывод</a:t>
-            </a:r>
-            <a:endParaRPr lang="en-US" dirty="0"/>
-          </a:p>
-        </p:txBody>
-      </p:sp>
-      <p:sp>
-        <p:nvSpPr>
-          <p:cNvPr id="3" name="Content Placeholder 2"/>
-          <p:cNvSpPr>
-            <a:spLocks noGrp="1"/>
-          </p:cNvSpPr>
-          <p:nvPr>
-            <p:ph idx="1"/>
-          </p:nvPr>
-        </p:nvSpPr>
-        <p:spPr>
-          <a:xfrm>
-            <a:off x="647700" y="1619250"/>
-            <a:ext cx="7670800" cy="3873103"/>
-          </a:xfrm>
-        </p:spPr>
-        <p:txBody>
-          <a:bodyPr>
-            <a:normAutofit fontScale="92500"/>
-          </a:bodyPr>
-          <a:lstStyle/>
-          <a:p>
-            <a:pPr marL="0" indent="0" algn="just">
-              <a:buNone/>
-            </a:pPr>
-            <a:r>
-              <a:rPr lang="ru-RU" dirty="0" smtClean="0"/>
-              <a:t>	</a:t>
-            </a:r>
-            <a:r>
-              <a:rPr lang="ru-RU" sz="2100" dirty="0"/>
-              <a:t/>
-            </a:r>
-            <a:br>
-              <a:rPr lang="ru-RU" sz="2100" dirty="0"/>
-            </a:br>
-            <a:r>
-              <a:rPr lang="ru-RU" sz="2100" dirty="0"/>
-              <a:t>	П</a:t>
-            </a:r>
-            <a:r>
-              <a:rPr lang="en-US" sz="2100" dirty="0" err="1"/>
-              <a:t>рограмма</a:t>
-            </a:r>
-            <a:r>
-              <a:rPr lang="en-US" sz="2100" dirty="0"/>
-              <a:t> </a:t>
-            </a:r>
-            <a:r>
-              <a:rPr lang="en-US" sz="2100" dirty="0" err="1"/>
-              <a:t>парсер</a:t>
-            </a:r>
-            <a:r>
-              <a:rPr lang="en-US" sz="2100" dirty="0"/>
-              <a:t> </a:t>
-            </a:r>
-            <a:r>
-              <a:rPr lang="en-US" sz="2100" dirty="0" err="1"/>
-              <a:t>выполняет</a:t>
-            </a:r>
-            <a:r>
-              <a:rPr lang="en-US" sz="2100" dirty="0"/>
-              <a:t> </a:t>
-            </a:r>
-            <a:r>
-              <a:rPr lang="en-US" sz="2100" dirty="0" err="1"/>
-              <a:t>базовые</a:t>
-            </a:r>
-            <a:r>
-              <a:rPr lang="en-US" sz="2100" dirty="0"/>
-              <a:t> </a:t>
-            </a:r>
-            <a:r>
-              <a:rPr lang="en-US" sz="2100" dirty="0" err="1"/>
-              <a:t>функции</a:t>
-            </a:r>
-            <a:r>
-              <a:rPr lang="en-US" sz="2100" dirty="0"/>
-              <a:t> </a:t>
-            </a:r>
-            <a:r>
-              <a:rPr lang="en-US" sz="2100" dirty="0" err="1"/>
-              <a:t>конвертации</a:t>
-            </a:r>
-            <a:r>
-              <a:rPr lang="en-US" sz="2100" dirty="0"/>
-              <a:t> </a:t>
-            </a:r>
-            <a:r>
-              <a:rPr lang="en-US" sz="2100" dirty="0" err="1"/>
-              <a:t>текста</a:t>
-            </a:r>
-            <a:r>
-              <a:rPr lang="en-US" sz="2100" dirty="0"/>
-              <a:t> </a:t>
-            </a:r>
-            <a:r>
-              <a:rPr lang="en-US" sz="2100" dirty="0" err="1"/>
-              <a:t>на</a:t>
-            </a:r>
-            <a:r>
-              <a:rPr lang="en-US" sz="2100" dirty="0"/>
-              <a:t> </a:t>
-            </a:r>
-            <a:r>
-              <a:rPr lang="en-US" sz="2100" dirty="0" err="1"/>
-              <a:t>естественном</a:t>
-            </a:r>
-            <a:r>
-              <a:rPr lang="en-US" sz="2100" dirty="0"/>
-              <a:t> </a:t>
-            </a:r>
-            <a:r>
-              <a:rPr lang="en-US" sz="2100" dirty="0" err="1"/>
-              <a:t>языке</a:t>
-            </a:r>
-            <a:r>
-              <a:rPr lang="en-US" sz="2100" dirty="0"/>
-              <a:t> </a:t>
-            </a:r>
-            <a:r>
-              <a:rPr lang="en-US" sz="2100" dirty="0" err="1"/>
-              <a:t>в</a:t>
-            </a:r>
-            <a:r>
-              <a:rPr lang="en-US" sz="2100" dirty="0"/>
-              <a:t> UML </a:t>
-            </a:r>
-            <a:r>
-              <a:rPr lang="en-US" sz="2100" dirty="0" err="1"/>
-              <a:t>диаграммы</a:t>
-            </a:r>
-            <a:r>
-              <a:rPr lang="en-US" sz="2100" dirty="0"/>
-              <a:t> </a:t>
-            </a:r>
-            <a:r>
-              <a:rPr lang="en-US" sz="2100" dirty="0" err="1"/>
-              <a:t>согласно</a:t>
-            </a:r>
-            <a:r>
-              <a:rPr lang="en-US" sz="2100" dirty="0"/>
-              <a:t> </a:t>
-            </a:r>
-            <a:r>
-              <a:rPr lang="ru-RU" sz="2100" dirty="0"/>
-              <a:t>разработанным </a:t>
-            </a:r>
-            <a:r>
-              <a:rPr lang="en-US" sz="2100" dirty="0" err="1"/>
-              <a:t>правилам</a:t>
-            </a:r>
-            <a:r>
-              <a:rPr lang="ru-RU" sz="2100" dirty="0"/>
-              <a:t>, однако </a:t>
-            </a:r>
-            <a:r>
-              <a:rPr lang="en-US" sz="2100" dirty="0" err="1"/>
-              <a:t>успешность</a:t>
-            </a:r>
-            <a:r>
-              <a:rPr lang="en-US" sz="2100" dirty="0"/>
-              <a:t> </a:t>
-            </a:r>
-            <a:r>
-              <a:rPr lang="en-US" sz="2100" dirty="0" err="1"/>
-              <a:t>конвертации</a:t>
-            </a:r>
-            <a:r>
-              <a:rPr lang="en-US" sz="2100" dirty="0"/>
-              <a:t> </a:t>
-            </a:r>
-            <a:r>
-              <a:rPr lang="en-US" sz="2100" dirty="0" err="1"/>
-              <a:t>зависит</a:t>
-            </a:r>
-            <a:r>
-              <a:rPr lang="en-US" sz="2100" dirty="0"/>
-              <a:t> </a:t>
-            </a:r>
-            <a:r>
-              <a:rPr lang="en-US" sz="2100" dirty="0" err="1"/>
-              <a:t>от</a:t>
-            </a:r>
-            <a:r>
-              <a:rPr lang="en-US" sz="2100" dirty="0"/>
-              <a:t> </a:t>
-            </a:r>
-            <a:r>
-              <a:rPr lang="en-US" sz="2100" dirty="0" err="1"/>
-              <a:t>многих</a:t>
-            </a:r>
-            <a:r>
-              <a:rPr lang="en-US" sz="2100" dirty="0"/>
-              <a:t> </a:t>
-            </a:r>
-            <a:r>
-              <a:rPr lang="en-US" sz="2100" dirty="0" err="1"/>
-              <a:t>факторов</a:t>
-            </a:r>
-            <a:r>
-              <a:rPr lang="ru-RU" sz="2100" dirty="0"/>
-              <a:t>: </a:t>
-            </a:r>
-          </a:p>
-          <a:p>
-            <a:pPr marL="0" indent="0" algn="just">
-              <a:buNone/>
-            </a:pPr>
-            <a:endParaRPr lang="ru-RU" sz="2100" dirty="0"/>
-          </a:p>
-          <a:p>
-            <a:pPr>
-              <a:buFontTx/>
-              <a:buChar char="-"/>
-            </a:pPr>
-            <a:r>
-              <a:rPr lang="ru-RU" sz="2100" dirty="0"/>
-              <a:t>объем текста;</a:t>
-            </a:r>
-          </a:p>
-          <a:p>
-            <a:pPr>
-              <a:buFontTx/>
-              <a:buChar char="-"/>
-            </a:pPr>
-            <a:r>
-              <a:rPr lang="ru-RU" sz="2100" dirty="0"/>
-              <a:t>его корректность с точки зрения орфографии и семантики; </a:t>
-            </a:r>
-          </a:p>
-          <a:p>
-            <a:pPr>
-              <a:buFontTx/>
-              <a:buChar char="-"/>
-            </a:pPr>
-            <a:r>
-              <a:rPr lang="ru-RU" sz="2100" dirty="0"/>
-              <a:t>результаты </a:t>
-            </a:r>
-            <a:r>
-              <a:rPr lang="ru-RU" sz="2100" dirty="0" err="1"/>
-              <a:t>парсинга</a:t>
-            </a:r>
-            <a:r>
-              <a:rPr lang="ru-RU" sz="2100" dirty="0"/>
-              <a:t> </a:t>
-            </a:r>
-            <a:r>
-              <a:rPr lang="en-US" sz="2100" dirty="0"/>
-              <a:t>Stanford Core NLP;</a:t>
-            </a:r>
-            <a:endParaRPr lang="ru-RU" sz="2100" dirty="0"/>
-          </a:p>
-          <a:p>
-            <a:pPr marL="0" indent="0">
-              <a:buNone/>
-            </a:pPr>
-            <a:r>
-              <a:rPr lang="ru-RU" sz="2100" dirty="0">
-                <a:solidFill>
-                  <a:schemeClr val="accent1"/>
-                </a:solidFill>
-              </a:rPr>
-              <a:t>-</a:t>
-            </a:r>
-            <a:r>
-              <a:rPr lang="ru-RU" sz="2100" dirty="0"/>
-              <a:t> корректность правил конвертации.</a:t>
-            </a:r>
-            <a:endParaRPr lang="en-US" sz="2100" dirty="0"/>
-          </a:p>
-        </p:txBody>
-      </p:sp>
-    </p:spTree>
-    <p:extLst>
-      <p:ext uri="{BB962C8B-B14F-4D97-AF65-F5344CB8AC3E}">
-        <p14:creationId xmlns:p14="http://schemas.microsoft.com/office/powerpoint/2010/main" val="1909838834"/>
       </p:ext>
     </p:extLst>
   </p:cSld>
@@ -5226,6 +4478,9 @@
                 <a:solidFill>
                   <a:schemeClr val="accent1"/>
                 </a:solidFill>
+                <a:latin typeface="Tahoma" charset="0"/>
+                <a:ea typeface="Tahoma" charset="0"/>
+                <a:cs typeface="Tahoma" charset="0"/>
               </a:rPr>
               <a:t>Цель работы</a:t>
             </a:r>
@@ -5234,6 +4489,9 @@
                 <a:solidFill>
                   <a:schemeClr val="accent1"/>
                 </a:solidFill>
+                <a:latin typeface="Tahoma" charset="0"/>
+                <a:ea typeface="Tahoma" charset="0"/>
+                <a:cs typeface="Tahoma" charset="0"/>
               </a:rPr>
               <a:t>:</a:t>
             </a:r>
@@ -5241,6 +4499,9 @@
               <a:solidFill>
                 <a:schemeClr val="accent1"/>
               </a:solidFill>
+              <a:latin typeface="Tahoma" charset="0"/>
+              <a:ea typeface="Tahoma" charset="0"/>
+              <a:cs typeface="Tahoma" charset="0"/>
             </a:endParaRPr>
           </a:p>
         </p:txBody>
@@ -5275,6 +4536,9 @@
                     <a:lumOff val="35000"/>
                   </a:schemeClr>
                 </a:solidFill>
+                <a:latin typeface="Tahoma" charset="0"/>
+                <a:ea typeface="Tahoma" charset="0"/>
+                <a:cs typeface="Tahoma" charset="0"/>
               </a:rPr>
               <a:t>Разработка </a:t>
             </a:r>
@@ -5286,6 +4550,9 @@
                     <a:lumOff val="35000"/>
                   </a:schemeClr>
                 </a:solidFill>
+                <a:latin typeface="Tahoma" charset="0"/>
+                <a:ea typeface="Tahoma" charset="0"/>
+                <a:cs typeface="Tahoma" charset="0"/>
               </a:rPr>
               <a:t>алгоритмического и программного обеспечения для получения структурированных представлений знаний из коротких семантически насыщенных текстов на естественном (</a:t>
             </a:r>
@@ -5297,6 +4564,9 @@
                     <a:lumOff val="35000"/>
                   </a:schemeClr>
                 </a:solidFill>
+                <a:latin typeface="Tahoma" charset="0"/>
+                <a:ea typeface="Tahoma" charset="0"/>
+                <a:cs typeface="Tahoma" charset="0"/>
               </a:rPr>
               <a:t>английском) языке.</a:t>
             </a:r>
@@ -5334,6 +4604,9 @@
                 <a:solidFill>
                   <a:schemeClr val="accent1"/>
                 </a:solidFill>
+                <a:latin typeface="Tahoma" charset="0"/>
+                <a:ea typeface="Tahoma" charset="0"/>
+                <a:cs typeface="Tahoma" charset="0"/>
               </a:rPr>
               <a:t>Задачи:</a:t>
             </a:r>
@@ -5341,6 +4614,9 @@
               <a:solidFill>
                 <a:schemeClr val="accent1"/>
               </a:solidFill>
+              <a:latin typeface="Tahoma" charset="0"/>
+              <a:ea typeface="Tahoma" charset="0"/>
+              <a:cs typeface="Tahoma" charset="0"/>
             </a:endParaRPr>
           </a:p>
         </p:txBody>
@@ -5354,7 +4630,7 @@
         <p:spPr>
           <a:xfrm>
             <a:off x="628648" y="3781692"/>
-            <a:ext cx="7639050" cy="2215991"/>
+            <a:ext cx="7639050" cy="2677656"/>
           </a:xfrm>
           <a:prstGeom prst="rect">
             <a:avLst/>
@@ -5371,35 +4647,6 @@
               <a:buFont typeface="Arial" charset="0"/>
               <a:buChar char="•"/>
             </a:pPr>
-            <a:endParaRPr lang="ru-RU" dirty="0" smtClean="0"/>
-          </a:p>
-          <a:p>
-            <a:pPr marL="285750" indent="-285750">
-              <a:buFont typeface="Arial" charset="0"/>
-              <a:buChar char="•"/>
-            </a:pPr>
-            <a:r>
-              <a:rPr lang="ru-RU" sz="2400" dirty="0" err="1">
-                <a:solidFill>
-                  <a:schemeClr val="tx1">
-                    <a:lumMod val="65000"/>
-                    <a:lumOff val="35000"/>
-                  </a:schemeClr>
-                </a:solidFill>
-              </a:rPr>
-              <a:t>разработа</a:t>
-            </a:r>
-            <a:r>
-              <a:rPr lang="uk-UA" sz="2400" dirty="0" err="1">
-                <a:solidFill>
-                  <a:schemeClr val="tx1">
-                    <a:lumMod val="65000"/>
-                    <a:lumOff val="35000"/>
-                  </a:schemeClr>
-                </a:solidFill>
-              </a:rPr>
-              <a:t>ть</a:t>
-            </a:r>
             <a:r>
               <a:rPr lang="ru-RU" sz="2400" dirty="0">
                 <a:solidFill>
@@ -5408,8 +4655,39 @@
                     <a:lumOff val="35000"/>
                   </a:schemeClr>
                 </a:solidFill>
-              </a:rPr>
-              <a:t> правила эвристики </a:t>
+                <a:latin typeface="Tahoma" charset="0"/>
+                <a:ea typeface="Tahoma" charset="0"/>
+                <a:cs typeface="Tahoma" charset="0"/>
+              </a:rPr>
+              <a:t>разработка эвристики и алгоритма </a:t>
+            </a:r>
+            <a:r>
+              <a:rPr lang="ru-RU" sz="2400" dirty="0" err="1" smtClean="0">
+                <a:solidFill>
+                  <a:schemeClr val="tx1">
+                    <a:lumMod val="65000"/>
+                    <a:lumOff val="35000"/>
+                  </a:schemeClr>
+                </a:solidFill>
+                <a:latin typeface="Tahoma" charset="0"/>
+                <a:ea typeface="Tahoma" charset="0"/>
+                <a:cs typeface="Tahoma" charset="0"/>
+              </a:rPr>
+              <a:t>преобразова-ния</a:t>
+            </a:r>
+            <a:r>
+              <a:rPr lang="ru-RU" sz="2400" dirty="0" smtClean="0">
+                <a:solidFill>
+                  <a:schemeClr val="tx1">
+                    <a:lumMod val="65000"/>
+                    <a:lumOff val="35000"/>
+                  </a:schemeClr>
+                </a:solidFill>
+                <a:latin typeface="Tahoma" charset="0"/>
+                <a:ea typeface="Tahoma" charset="0"/>
+                <a:cs typeface="Tahoma" charset="0"/>
+              </a:rPr>
+              <a:t> структурированных </a:t>
             </a:r>
             <a:r>
               <a:rPr lang="ru-RU" sz="2400" dirty="0">
@@ -5419,8 +4697,11 @@
                     <a:lumOff val="35000"/>
                   </a:schemeClr>
                 </a:solidFill>
-              </a:rPr>
-              <a:t>и</a:t>
+                <a:latin typeface="Tahoma" charset="0"/>
+                <a:ea typeface="Tahoma" charset="0"/>
+                <a:cs typeface="Tahoma" charset="0"/>
+              </a:rPr>
+              <a:t>текстов в модель </a:t>
             </a:r>
             <a:r>
               <a:rPr lang="ru-RU" sz="2400" dirty="0" smtClean="0">
@@ -5430,8 +4711,53 @@
                     <a:lumOff val="35000"/>
                   </a:schemeClr>
                 </a:solidFill>
-              </a:rPr>
-              <a:t> алгоритмов </a:t>
+                <a:latin typeface="Tahoma" charset="0"/>
+                <a:ea typeface="Tahoma" charset="0"/>
+                <a:cs typeface="Tahoma" charset="0"/>
+              </a:rPr>
+              <a:t>пред</a:t>
+            </a:r>
+            <a:r>
+              <a:rPr lang="en-US" sz="2400" dirty="0" smtClean="0">
+                <a:solidFill>
+                  <a:schemeClr val="tx1">
+                    <a:lumMod val="65000"/>
+                    <a:lumOff val="35000"/>
+                  </a:schemeClr>
+                </a:solidFill>
+                <a:latin typeface="Tahoma" charset="0"/>
+                <a:ea typeface="Tahoma" charset="0"/>
+                <a:cs typeface="Tahoma" charset="0"/>
+              </a:rPr>
+              <a:t>-</a:t>
+            </a:r>
+            <a:r>
+              <a:rPr lang="ru-RU" sz="2400" dirty="0" err="1" smtClean="0">
+                <a:solidFill>
+                  <a:schemeClr val="tx1">
+                    <a:lumMod val="65000"/>
+                    <a:lumOff val="35000"/>
+                  </a:schemeClr>
+                </a:solidFill>
+                <a:latin typeface="Tahoma" charset="0"/>
+                <a:ea typeface="Tahoma" charset="0"/>
+                <a:cs typeface="Tahoma" charset="0"/>
+              </a:rPr>
+              <a:t>ставления</a:t>
+            </a:r>
+            <a:r>
+              <a:rPr lang="ru-RU" sz="2400" dirty="0" smtClean="0">
+                <a:solidFill>
+                  <a:schemeClr val="tx1">
+                    <a:lumMod val="65000"/>
+                    <a:lumOff val="35000"/>
+                  </a:schemeClr>
+                </a:solidFill>
+                <a:latin typeface="Tahoma" charset="0"/>
+                <a:ea typeface="Tahoma" charset="0"/>
+                <a:cs typeface="Tahoma" charset="0"/>
+              </a:rPr>
+              <a:t> </a:t>
             </a:r>
             <a:r>
               <a:rPr lang="ru-RU" sz="2400" dirty="0">
@@ -5441,8 +4767,11 @@
                     <a:lumOff val="35000"/>
                   </a:schemeClr>
                 </a:solidFill>
-              </a:rPr>
-              <a:t>конвертации текста в </a:t>
+                <a:latin typeface="Tahoma" charset="0"/>
+                <a:ea typeface="Tahoma" charset="0"/>
+                <a:cs typeface="Tahoma" charset="0"/>
+              </a:rPr>
+              <a:t>данных на языке UML </a:t>
             </a:r>
             <a:r>
               <a:rPr lang="ru-RU" sz="2400" dirty="0" smtClean="0">
@@ -5452,8 +4781,11 @@
                     <a:lumOff val="35000"/>
                   </a:schemeClr>
                 </a:solidFill>
-              </a:rPr>
-              <a:t>структурированный вид на </a:t>
+                <a:latin typeface="Tahoma" charset="0"/>
+                <a:ea typeface="Tahoma" charset="0"/>
+                <a:cs typeface="Tahoma" charset="0"/>
+              </a:rPr>
+              <a:t>диаграммы </a:t>
             </a:r>
             <a:r>
               <a:rPr lang="ru-RU" sz="2400" dirty="0">
@@ -5463,23 +4795,74 @@
                     <a:lumOff val="35000"/>
                   </a:schemeClr>
                 </a:solidFill>
-              </a:rPr>
-              <a:t>языке моделирования UML </a:t>
-            </a:r>
-            <a:endParaRPr lang="ru-RU" sz="2400" dirty="0" smtClean="0">
-              <a:solidFill>
-                <a:schemeClr val="tx1">
-                  <a:lumMod val="65000"/>
-                  <a:lumOff val="35000"/>
-                </a:schemeClr>
-              </a:solidFill>
-            </a:endParaRPr>
+                <a:latin typeface="Tahoma" charset="0"/>
+                <a:ea typeface="Tahoma" charset="0"/>
+                <a:cs typeface="Tahoma" charset="0"/>
+              </a:rPr>
+              <a:t>классов</a:t>
+            </a:r>
           </a:p>
           <a:p>
             <a:pPr marL="285750" indent="-285750">
               <a:buFont typeface="Arial" charset="0"/>
               <a:buChar char="•"/>
             </a:pPr>
+            <a:r>
+              <a:rPr lang="ru-RU" sz="2400" dirty="0">
+                <a:solidFill>
+                  <a:schemeClr val="tx1">
+                    <a:lumMod val="65000"/>
+                    <a:lumOff val="35000"/>
+                  </a:schemeClr>
+                </a:solidFill>
+                <a:latin typeface="Tahoma" charset="0"/>
+                <a:ea typeface="Tahoma" charset="0"/>
+                <a:cs typeface="Tahoma" charset="0"/>
+              </a:rPr>
+              <a:t>разработать ПО реализующее эти </a:t>
+            </a:r>
+            <a:r>
+              <a:rPr lang="ru-RU" sz="2400" dirty="0" err="1" smtClean="0">
+                <a:solidFill>
+                  <a:schemeClr val="tx1">
+                    <a:lumMod val="65000"/>
+                    <a:lumOff val="35000"/>
+                  </a:schemeClr>
+                </a:solidFill>
+                <a:latin typeface="Tahoma" charset="0"/>
+                <a:ea typeface="Tahoma" charset="0"/>
+                <a:cs typeface="Tahoma" charset="0"/>
+              </a:rPr>
+              <a:t>преобразова</a:t>
+            </a:r>
+            <a:r>
+              <a:rPr lang="en-US" sz="2400" dirty="0" smtClean="0">
+                <a:solidFill>
+                  <a:schemeClr val="tx1">
+                    <a:lumMod val="65000"/>
+                    <a:lumOff val="35000"/>
+                  </a:schemeClr>
+                </a:solidFill>
+                <a:latin typeface="Tahoma" charset="0"/>
+                <a:ea typeface="Tahoma" charset="0"/>
+                <a:cs typeface="Tahoma" charset="0"/>
+              </a:rPr>
+              <a:t>-</a:t>
+            </a:r>
+            <a:r>
+              <a:rPr lang="ru-RU" sz="2400" dirty="0" err="1" smtClean="0">
+                <a:solidFill>
+                  <a:schemeClr val="tx1">
+                    <a:lumMod val="65000"/>
+                    <a:lumOff val="35000"/>
+                  </a:schemeClr>
+                </a:solidFill>
+                <a:latin typeface="Tahoma" charset="0"/>
+                <a:ea typeface="Tahoma" charset="0"/>
+                <a:cs typeface="Tahoma" charset="0"/>
+              </a:rPr>
+              <a:t>ния</a:t>
+            </a:r>
             <a:r>
               <a:rPr lang="ru-RU" sz="2400" dirty="0" smtClean="0">
                 <a:solidFill>
@@ -5488,8 +4871,11 @@
                     <a:lumOff val="35000"/>
                   </a:schemeClr>
                 </a:solidFill>
-              </a:rPr>
-              <a:t>разработать ПО реализующее </a:t>
+                <a:latin typeface="Tahoma" charset="0"/>
+                <a:ea typeface="Tahoma" charset="0"/>
+                <a:cs typeface="Tahoma" charset="0"/>
+              </a:rPr>
+              <a:t> </a:t>
             </a:r>
             <a:r>
               <a:rPr lang="ru-RU" sz="2400" dirty="0">
@@ -5499,9 +4885,29 @@
                     <a:lumOff val="35000"/>
                   </a:schemeClr>
                 </a:solidFill>
-              </a:rPr>
-              <a:t>эти преобразования в репрезентацию на языке XMI</a:t>
-            </a:r>
+                <a:latin typeface="Tahoma" charset="0"/>
+                <a:ea typeface="Tahoma" charset="0"/>
+                <a:cs typeface="Tahoma" charset="0"/>
+              </a:rPr>
+              <a:t>в репрезентацию на языке XMI</a:t>
+            </a:r>
+            <a:endParaRPr lang="en-US" sz="2400" dirty="0">
+              <a:solidFill>
+                <a:schemeClr val="tx1">
+                  <a:lumMod val="65000"/>
+                  <a:lumOff val="35000"/>
+                </a:schemeClr>
+              </a:solidFill>
+              <a:latin typeface="Tahoma" charset="0"/>
+              <a:ea typeface="Tahoma" charset="0"/>
+              <a:cs typeface="Tahoma" charset="0"/>
+            </a:endParaRPr>
+          </a:p>
+          <a:p>
+            <a:pPr marL="285750" indent="-285750">
+              <a:buFont typeface="Arial" charset="0"/>
+              <a:buChar char="•"/>
+            </a:pPr>
             <a:endParaRPr lang="en-US" sz="2400" dirty="0">
               <a:solidFill>
                 <a:schemeClr val="tx1">
@@ -5574,16 +4980,16 @@
           <a:p>
             <a:r>
               <a:rPr lang="ru-RU" sz="2400" dirty="0" smtClean="0">
-                <a:latin typeface="Helvetica Neue" charset="0"/>
-                <a:ea typeface="Helvetica Neue" charset="0"/>
-                <a:cs typeface="Helvetica Neue" charset="0"/>
+                <a:latin typeface="Tahoma" charset="0"/>
+                <a:ea typeface="Tahoma" charset="0"/>
+                <a:cs typeface="Tahoma" charset="0"/>
               </a:rPr>
               <a:t>Библиотеки, технологии, методы</a:t>
             </a:r>
             <a:endParaRPr lang="en-US" sz="2400" dirty="0">
-              <a:latin typeface="Helvetica Neue" charset="0"/>
-              <a:ea typeface="Helvetica Neue" charset="0"/>
-              <a:cs typeface="Helvetica Neue" charset="0"/>
+              <a:latin typeface="Tahoma" charset="0"/>
+              <a:ea typeface="Tahoma" charset="0"/>
+              <a:cs typeface="Tahoma" charset="0"/>
             </a:endParaRPr>
           </a:p>
         </p:txBody>
@@ -5631,16 +5037,16 @@
           <a:p>
             <a:r>
               <a:rPr lang="ru-RU" sz="2400" dirty="0" smtClean="0">
-                <a:latin typeface="Helvetica Neue" charset="0"/>
-                <a:ea typeface="Helvetica Neue" charset="0"/>
-                <a:cs typeface="Helvetica Neue" charset="0"/>
+                <a:latin typeface="Tahoma" charset="0"/>
+                <a:ea typeface="Tahoma" charset="0"/>
+                <a:cs typeface="Tahoma" charset="0"/>
               </a:rPr>
               <a:t>Новизна</a:t>
             </a:r>
             <a:endParaRPr lang="en-US" sz="2400" dirty="0">
-              <a:latin typeface="Helvetica Neue" charset="0"/>
-              <a:ea typeface="Helvetica Neue" charset="0"/>
-              <a:cs typeface="Helvetica Neue" charset="0"/>
+              <a:latin typeface="Tahoma" charset="0"/>
+              <a:ea typeface="Tahoma" charset="0"/>
+              <a:cs typeface="Tahoma" charset="0"/>
             </a:endParaRPr>
           </a:p>
         </p:txBody>
@@ -5923,16 +5329,33 @@
             </a:pPr>
             <a:r>
               <a:rPr lang="ru-RU" sz="2400" dirty="0" smtClean="0">
-                <a:latin typeface="+mj-lt"/>
+                <a:latin typeface="Tahoma" charset="0"/>
+                <a:ea typeface="Tahoma" charset="0"/>
+                <a:cs typeface="Tahoma" charset="0"/>
               </a:rPr>
               <a:t>Использование отношений </a:t>
             </a:r>
             <a:r>
               <a:rPr lang="en-US" sz="2400" dirty="0" smtClean="0">
-                <a:latin typeface="+mj-lt"/>
+                <a:latin typeface="Tahoma" charset="0"/>
+                <a:ea typeface="Tahoma" charset="0"/>
+                <a:cs typeface="Tahoma" charset="0"/>
               </a:rPr>
               <a:t>NP,VP </a:t>
             </a:r>
+            <a:r>
+              <a:rPr lang="en-US" sz="2400" dirty="0" smtClean="0">
+                <a:latin typeface="Tahoma" charset="0"/>
+                <a:ea typeface="Tahoma" charset="0"/>
+                <a:cs typeface="Tahoma" charset="0"/>
+              </a:rPr>
+              <a:t>Stanford Core NLP</a:t>
+            </a:r>
+            <a:endParaRPr lang="en-US" sz="2400" dirty="0" smtClean="0">
+              <a:latin typeface="Tahoma" charset="0"/>
+              <a:ea typeface="Tahoma" charset="0"/>
+              <a:cs typeface="Tahoma" charset="0"/>
+            </a:endParaRPr>
           </a:p>
           <a:p>
             <a:pPr>
@@ -5945,10 +5368,41 @@
             </a:pPr>
             <a:r>
               <a:rPr lang="ru-RU" sz="2400" dirty="0" smtClean="0">
-                <a:latin typeface="+mj-lt"/>
-              </a:rPr>
-              <a:t>Разработка правил конвертации</a:t>
-            </a:r>
+                <a:latin typeface="Tahoma" charset="0"/>
+                <a:ea typeface="Tahoma" charset="0"/>
+                <a:cs typeface="Tahoma" charset="0"/>
+              </a:rPr>
+              <a:t>Разработка </a:t>
+            </a:r>
+            <a:r>
+              <a:rPr lang="ru-RU" sz="2400" dirty="0" smtClean="0">
+                <a:latin typeface="Tahoma" charset="0"/>
+                <a:ea typeface="Tahoma" charset="0"/>
+                <a:cs typeface="Tahoma" charset="0"/>
+              </a:rPr>
+              <a:t>правил</a:t>
+            </a:r>
+            <a:r>
+              <a:rPr lang="en-US" sz="2400" dirty="0" smtClean="0">
+                <a:latin typeface="Tahoma" charset="0"/>
+                <a:ea typeface="Tahoma" charset="0"/>
+                <a:cs typeface="Tahoma" charset="0"/>
+              </a:rPr>
+              <a:t> </a:t>
+            </a:r>
+            <a:r>
+              <a:rPr lang="ru-RU" sz="2400" dirty="0" smtClean="0">
+                <a:latin typeface="Tahoma" charset="0"/>
+                <a:ea typeface="Tahoma" charset="0"/>
+                <a:cs typeface="Tahoma" charset="0"/>
+              </a:rPr>
+              <a:t>преобразования</a:t>
+            </a:r>
+            <a:endParaRPr lang="ru-RU" sz="2400" dirty="0" smtClean="0">
+              <a:latin typeface="Tahoma" charset="0"/>
+              <a:ea typeface="Tahoma" charset="0"/>
+              <a:cs typeface="Tahoma" charset="0"/>
+            </a:endParaRPr>
           </a:p>
           <a:p>
             <a:pPr>
@@ -5960,7 +5414,9 @@
               </a:spcBef>
             </a:pPr>
             <a:endParaRPr lang="en-US" sz="2100" dirty="0">
-              <a:latin typeface="+mj-lt"/>
+              <a:latin typeface="Tahoma" charset="0"/>
+              <a:ea typeface="Tahoma" charset="0"/>
+              <a:cs typeface="Tahoma" charset="0"/>
             </a:endParaRPr>
           </a:p>
         </p:txBody>
@@ -5976,7 +5432,7 @@
         <p:spPr>
           <a:xfrm>
             <a:off x="857250" y="1210825"/>
-            <a:ext cx="7587234" cy="2219676"/>
+            <a:ext cx="7414641" cy="2219676"/>
           </a:xfrm>
           <a:prstGeom prst="rect">
             <a:avLst/>
@@ -6243,7 +5699,9 @@
             </a:pPr>
             <a:r>
               <a:rPr lang="en-US" sz="2400" dirty="0" smtClean="0">
-                <a:latin typeface="+mj-lt"/>
+                <a:latin typeface="Tahoma" charset="0"/>
+                <a:ea typeface="Tahoma" charset="0"/>
+                <a:cs typeface="Tahoma" charset="0"/>
               </a:rPr>
               <a:t>Stanford Core NLP</a:t>
             </a:r>
@@ -6258,10 +5716,18 @@
               </a:spcBef>
             </a:pPr>
             <a:r>
-              <a:rPr lang="fr-FR" sz="2400" dirty="0" err="1" smtClean="0"/>
+              <a:rPr lang="fr-FR" sz="2400" dirty="0" err="1" smtClean="0">
+                <a:latin typeface="Tahoma" charset="0"/>
+                <a:ea typeface="Tahoma" charset="0"/>
+                <a:cs typeface="Tahoma" charset="0"/>
+              </a:rPr>
               <a:t>JGraphT</a:t>
             </a:r>
-            <a:endParaRPr lang="fr-FR" sz="2400" dirty="0" smtClean="0"/>
+            <a:endParaRPr lang="fr-FR" sz="2400" dirty="0" smtClean="0">
+              <a:latin typeface="Tahoma" charset="0"/>
+              <a:ea typeface="Tahoma" charset="0"/>
+              <a:cs typeface="Tahoma" charset="0"/>
+            </a:endParaRPr>
           </a:p>
           <a:p>
             <a:pPr>
@@ -6274,7 +5740,9 @@
             </a:pPr>
             <a:r>
               <a:rPr lang="fr-FR" sz="2400" dirty="0" smtClean="0">
-                <a:latin typeface="+mj-lt"/>
+                <a:latin typeface="Tahoma" charset="0"/>
+                <a:ea typeface="Tahoma" charset="0"/>
+                <a:cs typeface="Tahoma" charset="0"/>
               </a:rPr>
               <a:t>Java</a:t>
             </a:r>
@@ -6289,7 +5757,11 @@
               </a:spcBef>
             </a:pPr>
             <a:r>
-              <a:rPr lang="en-US" sz="2400" dirty="0" smtClean="0"/>
+              <a:rPr lang="en-US" sz="2400" dirty="0" smtClean="0">
+                <a:latin typeface="Tahoma" charset="0"/>
+                <a:ea typeface="Tahoma" charset="0"/>
+                <a:cs typeface="Tahoma" charset="0"/>
+              </a:rPr>
               <a:t>JAXB, Maven</a:t>
             </a:r>
           </a:p>
@@ -6303,10 +5775,26 @@
               </a:spcBef>
             </a:pPr>
             <a:r>
-              <a:rPr lang="fr-FR" sz="2400" dirty="0" smtClean="0"/>
-              <a:t>XMI, XML, UML</a:t>
-            </a:r>
-            <a:endParaRPr lang="en-US" sz="2400" dirty="0" smtClean="0"/>
+              <a:rPr lang="fr-FR" sz="2400" dirty="0" smtClean="0">
+                <a:latin typeface="Tahoma" charset="0"/>
+                <a:ea typeface="Tahoma" charset="0"/>
+                <a:cs typeface="Tahoma" charset="0"/>
+              </a:rPr>
+              <a:t>XMI, XML, </a:t>
+            </a:r>
+            <a:r>
+              <a:rPr lang="fr-FR" sz="2400" dirty="0" smtClean="0">
+                <a:latin typeface="Tahoma" charset="0"/>
+                <a:ea typeface="Tahoma" charset="0"/>
+                <a:cs typeface="Tahoma" charset="0"/>
+              </a:rPr>
+              <a:t>UML</a:t>
+            </a:r>
+            <a:endParaRPr lang="ru-RU" sz="2100" dirty="0" smtClean="0">
+              <a:latin typeface="Tahoma" charset="0"/>
+              <a:ea typeface="Tahoma" charset="0"/>
+              <a:cs typeface="Tahoma" charset="0"/>
+            </a:endParaRPr>
           </a:p>
           <a:p>
             <a:pPr>
@@ -6318,20 +5806,9 @@
               </a:spcBef>
             </a:pPr>
             <a:endParaRPr lang="ru-RU" sz="2100" dirty="0" smtClean="0">
-              <a:latin typeface="+mj-lt"/>
-            </a:endParaRPr>
-          </a:p>
-          <a:p>
-            <a:pPr>
-              <a:lnSpc>
-                <a:spcPct val="100000"/>
-              </a:lnSpc>
-              <a:spcBef>
-                <a:spcPts val="0"/>
-              </a:spcBef>
-            </a:pPr>
-            <a:endParaRPr lang="ru-RU" sz="2100" dirty="0" smtClean="0">
-              <a:latin typeface="+mj-lt"/>
+              <a:latin typeface="Tahoma" charset="0"/>
+              <a:ea typeface="Tahoma" charset="0"/>
+              <a:cs typeface="Tahoma" charset="0"/>
             </a:endParaRPr>
           </a:p>
         </p:txBody>
@@ -6397,48 +5874,48 @@
           <a:p>
             <a:r>
               <a:rPr lang="en-US" sz="2400" dirty="0" smtClean="0">
-                <a:latin typeface="Helvetica Neue" charset="0"/>
-                <a:ea typeface="Helvetica Neue" charset="0"/>
-                <a:cs typeface="Helvetica Neue" charset="0"/>
+                <a:latin typeface="Tahoma" charset="0"/>
+                <a:ea typeface="Tahoma" charset="0"/>
+                <a:cs typeface="Tahoma" charset="0"/>
               </a:rPr>
               <a:t>NP </a:t>
             </a:r>
             <a:r>
               <a:rPr lang="ru-RU" sz="2400" dirty="0">
-                <a:latin typeface="Helvetica Neue" charset="0"/>
-                <a:ea typeface="Helvetica Neue" charset="0"/>
-                <a:cs typeface="Helvetica Neue" charset="0"/>
+                <a:latin typeface="Tahoma" charset="0"/>
+                <a:ea typeface="Tahoma" charset="0"/>
+                <a:cs typeface="Tahoma" charset="0"/>
               </a:rPr>
               <a:t>– </a:t>
             </a:r>
             <a:r>
               <a:rPr lang="ru-RU" sz="2400" dirty="0" smtClean="0">
-                <a:latin typeface="Helvetica Neue" charset="0"/>
-                <a:ea typeface="Helvetica Neue" charset="0"/>
-                <a:cs typeface="Helvetica Neue" charset="0"/>
+                <a:latin typeface="Tahoma" charset="0"/>
+                <a:ea typeface="Tahoma" charset="0"/>
+                <a:cs typeface="Tahoma" charset="0"/>
               </a:rPr>
               <a:t>вершины</a:t>
             </a:r>
             <a:r>
               <a:rPr lang="en-US" sz="2400" dirty="0" smtClean="0">
-                <a:latin typeface="Helvetica Neue" charset="0"/>
-                <a:ea typeface="Helvetica Neue" charset="0"/>
-                <a:cs typeface="Helvetica Neue" charset="0"/>
+                <a:latin typeface="Tahoma" charset="0"/>
+                <a:ea typeface="Tahoma" charset="0"/>
+                <a:cs typeface="Tahoma" charset="0"/>
               </a:rPr>
               <a:t>, VP </a:t>
             </a:r>
             <a:r>
               <a:rPr lang="ru-RU" sz="2400" dirty="0" smtClean="0">
-                <a:latin typeface="Helvetica Neue" charset="0"/>
-                <a:ea typeface="Helvetica Neue" charset="0"/>
-                <a:cs typeface="Helvetica Neue" charset="0"/>
+                <a:latin typeface="Tahoma" charset="0"/>
+                <a:ea typeface="Tahoma" charset="0"/>
+                <a:cs typeface="Tahoma" charset="0"/>
               </a:rPr>
               <a:t>– ребра</a:t>
             </a:r>
             <a:endParaRPr lang="en-US" sz="2400" dirty="0">
-              <a:latin typeface="Helvetica Neue" charset="0"/>
-              <a:ea typeface="Helvetica Neue" charset="0"/>
-              <a:cs typeface="Helvetica Neue" charset="0"/>
+              <a:latin typeface="Tahoma" charset="0"/>
+              <a:ea typeface="Tahoma" charset="0"/>
+              <a:cs typeface="Tahoma" charset="0"/>
             </a:endParaRPr>
           </a:p>
         </p:txBody>
@@ -6522,7 +5999,7 @@
         </p:nvSpPr>
         <p:spPr>
           <a:xfrm>
-            <a:off x="585355" y="565280"/>
+            <a:off x="599210" y="288190"/>
             <a:ext cx="7561257" cy="735315"/>
           </a:xfrm>
         </p:spPr>
@@ -6558,14 +6035,14 @@
             <p:ph idx="1"/>
             <p:extLst>
               <p:ext uri="{D42A27DB-BD31-4B8C-83A1-F6EECF244321}">
-                <p14:modId xmlns:p14="http://schemas.microsoft.com/office/powerpoint/2010/main" val="1669554036"/>
+                <p14:modId xmlns:p14="http://schemas.microsoft.com/office/powerpoint/2010/main" val="541069098"/>
               </p:ext>
             </p:extLst>
           </p:nvPr>
         </p:nvGraphicFramePr>
         <p:xfrm>
-          <a:off x="1814944" y="1813213"/>
-          <a:ext cx="6068292" cy="4629151"/>
+          <a:off x="1174291" y="1413164"/>
+          <a:ext cx="6411094" cy="5024100"/>
         </p:xfrm>
         <a:graphic>
           <a:graphicData uri="http://schemas.openxmlformats.org/drawingml/2006/table">
@@ -6574,56 +6051,71 @@
                 <a:tableStyleId>{5C22544A-7EE6-4342-B048-85BDC9FD1C3A}</a:tableStyleId>
               </a:tblPr>
               <a:tblGrid>
-                <a:gridCol w="3034146"/>
-                <a:gridCol w="3034146"/>
+                <a:gridCol w="3205547"/>
+                <a:gridCol w="3205547"/>
               </a:tblGrid>
-              <a:tr h="222516">
+              <a:tr h="368531">
                 <a:tc>
                   <a:txBody>
                     <a:bodyPr/>
                     <a:lstStyle/>
                     <a:p>
                       <a:pPr algn="ctr">
+                        <a:lnSpc>
+                          <a:spcPct val="100000"/>
+                        </a:lnSpc>
                         <a:spcAft>
                           <a:spcPts val="0"/>
                         </a:spcAft>
                       </a:pPr>
                       <a:r>
-                        <a:rPr lang="ru-RU" sz="1100" dirty="0" smtClean="0">
+                        <a:rPr lang="ru-RU" sz="1600" dirty="0" smtClean="0">
                           <a:effectLst/>
+                          <a:latin typeface="Tahoma" charset="0"/>
+                          <a:ea typeface="Tahoma" charset="0"/>
+                          <a:cs typeface="Tahoma" charset="0"/>
                         </a:rPr>
                         <a:t>Ч</a:t>
                       </a:r>
                       <a:r>
-                        <a:rPr lang="en-US" sz="1100" dirty="0" err="1" smtClean="0">
+                        <a:rPr lang="en-US" sz="1600" dirty="0" err="1" smtClean="0">
                           <a:effectLst/>
+                          <a:latin typeface="Tahoma" charset="0"/>
+                          <a:ea typeface="Tahoma" charset="0"/>
+                          <a:cs typeface="Tahoma" charset="0"/>
                         </a:rPr>
                         <a:t>асти</a:t>
                       </a:r>
                       <a:r>
-                        <a:rPr lang="en-US" sz="1100" dirty="0" smtClean="0">
+                        <a:rPr lang="en-US" sz="1600" dirty="0" smtClean="0">
                           <a:effectLst/>
+                          <a:latin typeface="Tahoma" charset="0"/>
+                          <a:ea typeface="Tahoma" charset="0"/>
+                          <a:cs typeface="Tahoma" charset="0"/>
                         </a:rPr>
                         <a:t> </a:t>
                       </a:r>
                       <a:r>
-                        <a:rPr lang="ru-RU" sz="1100" dirty="0" smtClean="0">
+                        <a:rPr lang="ru-RU" sz="1600" dirty="0" smtClean="0">
                           <a:effectLst/>
+                          <a:latin typeface="Tahoma" charset="0"/>
+                          <a:ea typeface="Tahoma" charset="0"/>
+                          <a:cs typeface="Tahoma" charset="0"/>
                         </a:rPr>
                         <a:t>речи</a:t>
                       </a:r>
-                      <a:endParaRPr lang="en-US" sz="800" b="1" dirty="0">
+                      <a:endParaRPr lang="en-US" sz="1600" b="1" dirty="0">
                         <a:solidFill>
                           <a:srgbClr val="000000"/>
                         </a:solidFill>
                         <a:effectLst/>
-                        <a:latin typeface="Helvetica" charset="0"/>
-                        <a:ea typeface="Helvetica" charset="0"/>
-                        <a:cs typeface="Helvetica" charset="0"/>
+                        <a:latin typeface="Tahoma" charset="0"/>
+                        <a:ea typeface="Tahoma" charset="0"/>
+                        <a:cs typeface="Tahoma" charset="0"/>
                       </a:endParaRPr>
                     </a:p>
                   </a:txBody>
-                  <a:tcPr marL="51435" marR="51435" marT="0" marB="0"/>
+                  <a:tcPr marL="54341" marR="54341" marT="0" marB="0"/>
                 </a:tc>
                 <a:tc>
                   <a:txBody>
@@ -6631,37 +6123,46 @@
                     <a:lstStyle/>
                     <a:p>
                       <a:pPr algn="ctr">
+                        <a:lnSpc>
+                          <a:spcPct val="100000"/>
+                        </a:lnSpc>
                         <a:spcAft>
                           <a:spcPts val="0"/>
                         </a:spcAft>
                       </a:pPr>
                       <a:r>
-                        <a:rPr lang="en-US" sz="1100" dirty="0">
+                        <a:rPr lang="en-US" sz="1600" dirty="0">
                           <a:effectLst/>
+                          <a:latin typeface="Tahoma" charset="0"/>
+                          <a:ea typeface="Tahoma" charset="0"/>
+                          <a:cs typeface="Tahoma" charset="0"/>
                         </a:rPr>
                         <a:t>UML </a:t>
                       </a:r>
                       <a:r>
-                        <a:rPr lang="ru-RU" sz="1100" dirty="0" smtClean="0">
+                        <a:rPr lang="ru-RU" sz="1600" dirty="0" smtClean="0">
                           <a:effectLst/>
+                          <a:latin typeface="Tahoma" charset="0"/>
+                          <a:ea typeface="Tahoma" charset="0"/>
+                          <a:cs typeface="Tahoma" charset="0"/>
                         </a:rPr>
                         <a:t>сущности</a:t>
                       </a:r>
-                      <a:endParaRPr lang="en-US" sz="800" b="1" dirty="0">
+                      <a:endParaRPr lang="en-US" sz="1600" b="1" dirty="0">
                         <a:solidFill>
                           <a:srgbClr val="000000"/>
                         </a:solidFill>
                         <a:effectLst/>
-                        <a:latin typeface="Helvetica" charset="0"/>
-                        <a:ea typeface="Helvetica" charset="0"/>
-                        <a:cs typeface="Helvetica" charset="0"/>
+                        <a:latin typeface="Tahoma" charset="0"/>
+                        <a:ea typeface="Tahoma" charset="0"/>
+                        <a:cs typeface="Tahoma" charset="0"/>
                       </a:endParaRPr>
                     </a:p>
                   </a:txBody>
-                  <a:tcPr marL="51435" marR="51435" marT="0" marB="0"/>
+                  <a:tcPr marL="54341" marR="54341" marT="0" marB="0"/>
                 </a:tc>
               </a:tr>
-              <a:tr h="314760">
+              <a:tr h="332541">
                 <a:tc>
                   <a:txBody>
                     <a:bodyPr/>
@@ -6669,30 +6170,33 @@
                     <a:p>
                       <a:pPr>
                         <a:lnSpc>
-                          <a:spcPct val="150000"/>
+                          <a:spcPct val="100000"/>
                         </a:lnSpc>
                         <a:spcAft>
                           <a:spcPts val="0"/>
                         </a:spcAft>
                       </a:pPr>
                       <a:r>
-                        <a:rPr lang="en-US" sz="1100" dirty="0">
+                        <a:rPr lang="en-US" sz="1600" dirty="0">
                           <a:effectLst/>
+                          <a:latin typeface="Tahoma" charset="0"/>
+                          <a:ea typeface="Tahoma" charset="0"/>
+                          <a:cs typeface="Tahoma" charset="0"/>
                         </a:rPr>
                         <a:t>NN, NNP, PRP, NNS</a:t>
                       </a:r>
-                      <a:endParaRPr lang="en-US" sz="800" dirty="0">
+                      <a:endParaRPr lang="en-US" sz="1600" dirty="0">
                         <a:solidFill>
                           <a:srgbClr val="000000"/>
                         </a:solidFill>
                         <a:effectLst/>
-                        <a:latin typeface="Helvetica" charset="0"/>
-                        <a:ea typeface="Arial Unicode MS" charset="0"/>
-                        <a:cs typeface="Arial Unicode MS" charset="0"/>
+                        <a:latin typeface="Tahoma" charset="0"/>
+                        <a:ea typeface="Tahoma" charset="0"/>
+                        <a:cs typeface="Tahoma" charset="0"/>
                       </a:endParaRPr>
                     </a:p>
                   </a:txBody>
-                  <a:tcPr marL="51435" marR="51435" marT="0" marB="0"/>
+                  <a:tcPr marL="54341" marR="54341" marT="0" marB="0"/>
                 </a:tc>
                 <a:tc>
                   <a:txBody>
@@ -6701,51 +6205,63 @@
                     <a:p>
                       <a:pPr>
                         <a:lnSpc>
-                          <a:spcPct val="150000"/>
+                          <a:spcPct val="100000"/>
                         </a:lnSpc>
                         <a:spcAft>
                           <a:spcPts val="0"/>
                         </a:spcAft>
                       </a:pPr>
                       <a:r>
-                        <a:rPr lang="en-US" sz="1100" dirty="0" err="1" smtClean="0">
+                        <a:rPr lang="en-US" sz="1600" dirty="0" err="1" smtClean="0">
                           <a:effectLst/>
+                          <a:latin typeface="Tahoma" charset="0"/>
+                          <a:ea typeface="Tahoma" charset="0"/>
+                          <a:cs typeface="Tahoma" charset="0"/>
                         </a:rPr>
                         <a:t>Кла</a:t>
                       </a:r>
                       <a:r>
-                        <a:rPr lang="ru-RU" sz="1100" dirty="0" smtClean="0">
+                        <a:rPr lang="ru-RU" sz="1600" dirty="0" smtClean="0">
                           <a:effectLst/>
+                          <a:latin typeface="Tahoma" charset="0"/>
+                          <a:ea typeface="Tahoma" charset="0"/>
+                          <a:cs typeface="Tahoma" charset="0"/>
                         </a:rPr>
                         <a:t>с</a:t>
                       </a:r>
                       <a:r>
-                        <a:rPr lang="en-US" sz="1100" dirty="0" err="1" smtClean="0">
+                        <a:rPr lang="en-US" sz="1600" dirty="0" err="1" smtClean="0">
                           <a:effectLst/>
+                          <a:latin typeface="Tahoma" charset="0"/>
+                          <a:ea typeface="Tahoma" charset="0"/>
+                          <a:cs typeface="Tahoma" charset="0"/>
                         </a:rPr>
                         <a:t>с</a:t>
                       </a:r>
                       <a:r>
-                        <a:rPr lang="ru-RU" sz="1100" dirty="0" smtClean="0">
+                        <a:rPr lang="ru-RU" sz="1600" dirty="0" smtClean="0">
                           <a:effectLst/>
+                          <a:latin typeface="Tahoma" charset="0"/>
+                          <a:ea typeface="Tahoma" charset="0"/>
+                          <a:cs typeface="Tahoma" charset="0"/>
                         </a:rPr>
                         <a:t>ы</a:t>
                       </a:r>
-                      <a:endParaRPr lang="en-US" sz="800" dirty="0">
+                      <a:endParaRPr lang="en-US" sz="1600" dirty="0">
                         <a:solidFill>
                           <a:srgbClr val="000000"/>
                         </a:solidFill>
                         <a:effectLst/>
-                        <a:latin typeface="Helvetica" charset="0"/>
-                        <a:ea typeface="Arial Unicode MS" charset="0"/>
-                        <a:cs typeface="Arial Unicode MS" charset="0"/>
+                        <a:latin typeface="Tahoma" charset="0"/>
+                        <a:ea typeface="Tahoma" charset="0"/>
+                        <a:cs typeface="Tahoma" charset="0"/>
                       </a:endParaRPr>
                     </a:p>
                   </a:txBody>
-                  <a:tcPr marL="51435" marR="51435" marT="0" marB="0"/>
+                  <a:tcPr marL="54341" marR="54341" marT="0" marB="0"/>
                 </a:tc>
               </a:tr>
-              <a:tr h="314760">
+              <a:tr h="332541">
                 <a:tc>
                   <a:txBody>
                     <a:bodyPr/>
@@ -6753,30 +6269,33 @@
                     <a:p>
                       <a:pPr>
                         <a:lnSpc>
-                          <a:spcPct val="150000"/>
+                          <a:spcPct val="100000"/>
                         </a:lnSpc>
                         <a:spcAft>
                           <a:spcPts val="0"/>
                         </a:spcAft>
                       </a:pPr>
                       <a:r>
-                        <a:rPr lang="en-US" sz="1100">
+                        <a:rPr lang="en-US" sz="1600" dirty="0">
                           <a:effectLst/>
+                          <a:latin typeface="Tahoma" charset="0"/>
+                          <a:ea typeface="Tahoma" charset="0"/>
+                          <a:cs typeface="Tahoma" charset="0"/>
                         </a:rPr>
                         <a:t>JJ, CD, RB</a:t>
                       </a:r>
-                      <a:endParaRPr lang="en-US" sz="800">
+                      <a:endParaRPr lang="en-US" sz="1600" dirty="0">
                         <a:solidFill>
                           <a:srgbClr val="000000"/>
                         </a:solidFill>
                         <a:effectLst/>
-                        <a:latin typeface="Helvetica" charset="0"/>
-                        <a:ea typeface="Arial Unicode MS" charset="0"/>
-                        <a:cs typeface="Arial Unicode MS" charset="0"/>
+                        <a:latin typeface="Tahoma" charset="0"/>
+                        <a:ea typeface="Tahoma" charset="0"/>
+                        <a:cs typeface="Tahoma" charset="0"/>
                       </a:endParaRPr>
                     </a:p>
                   </a:txBody>
-                  <a:tcPr marL="51435" marR="51435" marT="0" marB="0"/>
+                  <a:tcPr marL="54341" marR="54341" marT="0" marB="0"/>
                 </a:tc>
                 <a:tc>
                   <a:txBody>
@@ -6785,63 +6304,81 @@
                     <a:p>
                       <a:pPr>
                         <a:lnSpc>
-                          <a:spcPct val="150000"/>
+                          <a:spcPct val="100000"/>
                         </a:lnSpc>
                         <a:spcAft>
                           <a:spcPts val="0"/>
                         </a:spcAft>
                       </a:pPr>
                       <a:r>
-                        <a:rPr lang="en-US" sz="1100" dirty="0" err="1" smtClean="0">
+                        <a:rPr lang="en-US" sz="1600" dirty="0" err="1" smtClean="0">
                           <a:effectLst/>
+                          <a:latin typeface="Tahoma" charset="0"/>
+                          <a:ea typeface="Tahoma" charset="0"/>
+                          <a:cs typeface="Tahoma" charset="0"/>
                         </a:rPr>
                         <a:t>Атрибут</a:t>
                       </a:r>
                       <a:r>
-                        <a:rPr lang="ru-RU" sz="1100" dirty="0" smtClean="0">
+                        <a:rPr lang="ru-RU" sz="1600" dirty="0" smtClean="0">
                           <a:effectLst/>
+                          <a:latin typeface="Tahoma" charset="0"/>
+                          <a:ea typeface="Tahoma" charset="0"/>
+                          <a:cs typeface="Tahoma" charset="0"/>
                         </a:rPr>
                         <a:t>ы</a:t>
                       </a:r>
                       <a:r>
-                        <a:rPr lang="en-US" sz="1100" dirty="0" smtClean="0">
+                        <a:rPr lang="en-US" sz="1600" dirty="0" smtClean="0">
                           <a:effectLst/>
+                          <a:latin typeface="Tahoma" charset="0"/>
+                          <a:ea typeface="Tahoma" charset="0"/>
+                          <a:cs typeface="Tahoma" charset="0"/>
                         </a:rPr>
                         <a:t> </a:t>
                       </a:r>
                       <a:r>
-                        <a:rPr lang="en-US" sz="1100" dirty="0" err="1" smtClean="0">
+                        <a:rPr lang="en-US" sz="1600" dirty="0" err="1" smtClean="0">
                           <a:effectLst/>
+                          <a:latin typeface="Tahoma" charset="0"/>
+                          <a:ea typeface="Tahoma" charset="0"/>
+                          <a:cs typeface="Tahoma" charset="0"/>
                         </a:rPr>
                         <a:t>клас</a:t>
                       </a:r>
                       <a:r>
-                        <a:rPr lang="ru-RU" sz="1100" dirty="0" smtClean="0">
+                        <a:rPr lang="ru-RU" sz="1600" dirty="0" smtClean="0">
                           <a:effectLst/>
+                          <a:latin typeface="Tahoma" charset="0"/>
+                          <a:ea typeface="Tahoma" charset="0"/>
+                          <a:cs typeface="Tahoma" charset="0"/>
                         </a:rPr>
                         <a:t>со</a:t>
                       </a:r>
                       <a:r>
-                        <a:rPr lang="en-US" sz="1100" dirty="0" err="1" smtClean="0">
+                        <a:rPr lang="en-US" sz="1600" dirty="0" err="1" smtClean="0">
                           <a:effectLst/>
+                          <a:latin typeface="Tahoma" charset="0"/>
+                          <a:ea typeface="Tahoma" charset="0"/>
+                          <a:cs typeface="Tahoma" charset="0"/>
                         </a:rPr>
                         <a:t>в</a:t>
                       </a:r>
-                      <a:endParaRPr lang="en-US" sz="800" dirty="0">
+                      <a:endParaRPr lang="en-US" sz="1600" dirty="0">
                         <a:solidFill>
                           <a:srgbClr val="000000"/>
                         </a:solidFill>
                         <a:effectLst/>
-                        <a:latin typeface="Helvetica" charset="0"/>
-                        <a:ea typeface="Arial Unicode MS" charset="0"/>
-                        <a:cs typeface="Arial Unicode MS" charset="0"/>
+                        <a:latin typeface="Tahoma" charset="0"/>
+                        <a:ea typeface="Tahoma" charset="0"/>
+                        <a:cs typeface="Tahoma" charset="0"/>
                       </a:endParaRPr>
                     </a:p>
                   </a:txBody>
-                  <a:tcPr marL="51435" marR="51435" marT="0" marB="0"/>
+                  <a:tcPr marL="54341" marR="54341" marT="0" marB="0"/>
                 </a:tc>
               </a:tr>
-              <a:tr h="944279">
+              <a:tr h="997622">
                 <a:tc>
                   <a:txBody>
                     <a:bodyPr/>
@@ -6849,30 +6386,33 @@
                     <a:p>
                       <a:pPr>
                         <a:lnSpc>
-                          <a:spcPct val="150000"/>
+                          <a:spcPct val="100000"/>
                         </a:lnSpc>
                         <a:spcAft>
                           <a:spcPts val="0"/>
                         </a:spcAft>
                       </a:pPr>
                       <a:r>
-                        <a:rPr lang="en-US" sz="1100">
+                        <a:rPr lang="en-US" sz="1600" dirty="0">
                           <a:effectLst/>
+                          <a:latin typeface="Tahoma" charset="0"/>
+                          <a:ea typeface="Tahoma" charset="0"/>
+                          <a:cs typeface="Tahoma" charset="0"/>
                         </a:rPr>
                         <a:t>VBP, VBN, VBG, IN, TO, VBZ, ADVP, VB</a:t>
                       </a:r>
-                      <a:endParaRPr lang="en-US" sz="800">
+                      <a:endParaRPr lang="en-US" sz="1600" dirty="0">
                         <a:solidFill>
                           <a:srgbClr val="000000"/>
                         </a:solidFill>
                         <a:effectLst/>
-                        <a:latin typeface="Helvetica" charset="0"/>
-                        <a:ea typeface="Arial Unicode MS" charset="0"/>
-                        <a:cs typeface="Arial Unicode MS" charset="0"/>
+                        <a:latin typeface="Tahoma" charset="0"/>
+                        <a:ea typeface="Tahoma" charset="0"/>
+                        <a:cs typeface="Tahoma" charset="0"/>
                       </a:endParaRPr>
                     </a:p>
                   </a:txBody>
-                  <a:tcPr marL="51435" marR="51435" marT="0" marB="0"/>
+                  <a:tcPr marL="54341" marR="54341" marT="0" marB="0"/>
                 </a:tc>
                 <a:tc>
                   <a:txBody>
@@ -6881,45 +6421,54 @@
                     <a:p>
                       <a:pPr>
                         <a:lnSpc>
-                          <a:spcPct val="150000"/>
+                          <a:spcPct val="100000"/>
                         </a:lnSpc>
                         <a:spcAft>
                           <a:spcPts val="0"/>
                         </a:spcAft>
                       </a:pPr>
                       <a:r>
-                        <a:rPr lang="ru-RU" sz="1100" dirty="0" smtClean="0">
+                        <a:rPr lang="ru-RU" sz="1600" dirty="0" smtClean="0">
                           <a:effectLst/>
+                          <a:latin typeface="Tahoma" charset="0"/>
+                          <a:ea typeface="Tahoma" charset="0"/>
+                          <a:cs typeface="Tahoma" charset="0"/>
                         </a:rPr>
                         <a:t>Зависимости между классами (ассоциация</a:t>
                       </a:r>
                       <a:r>
-                        <a:rPr lang="ru-RU" sz="1100" dirty="0">
+                        <a:rPr lang="ru-RU" sz="1600" dirty="0">
                           <a:effectLst/>
+                          <a:latin typeface="Tahoma" charset="0"/>
+                          <a:ea typeface="Tahoma" charset="0"/>
+                          <a:cs typeface="Tahoma" charset="0"/>
                         </a:rPr>
                         <a:t>, </a:t>
                       </a:r>
                       <a:r>
-                        <a:rPr lang="ru-RU" sz="1100" dirty="0" smtClean="0">
+                        <a:rPr lang="ru-RU" sz="1600" dirty="0" smtClean="0">
                           <a:effectLst/>
+                          <a:latin typeface="Tahoma" charset="0"/>
+                          <a:ea typeface="Tahoma" charset="0"/>
+                          <a:cs typeface="Tahoma" charset="0"/>
                         </a:rPr>
                         <a:t>агрегация, генерализация)</a:t>
                       </a:r>
-                      <a:endParaRPr lang="en-US" sz="800" dirty="0">
+                      <a:endParaRPr lang="en-US" sz="1600" dirty="0">
                         <a:solidFill>
                           <a:srgbClr val="000000"/>
                         </a:solidFill>
                         <a:effectLst/>
-                        <a:latin typeface="Helvetica" charset="0"/>
-                        <a:ea typeface="Arial Unicode MS" charset="0"/>
-                        <a:cs typeface="Arial Unicode MS" charset="0"/>
+                        <a:latin typeface="Tahoma" charset="0"/>
+                        <a:ea typeface="Tahoma" charset="0"/>
+                        <a:cs typeface="Tahoma" charset="0"/>
                       </a:endParaRPr>
                     </a:p>
                   </a:txBody>
-                  <a:tcPr marL="51435" marR="51435" marT="0" marB="0"/>
+                  <a:tcPr marL="54341" marR="54341" marT="0" marB="0"/>
                 </a:tc>
               </a:tr>
-              <a:tr h="1259038">
+              <a:tr h="1330162">
                 <a:tc>
                   <a:txBody>
                     <a:bodyPr/>
@@ -6927,30 +6476,33 @@
                     <a:p>
                       <a:pPr>
                         <a:lnSpc>
-                          <a:spcPct val="150000"/>
+                          <a:spcPct val="100000"/>
                         </a:lnSpc>
                         <a:spcAft>
                           <a:spcPts val="0"/>
                         </a:spcAft>
                       </a:pPr>
                       <a:r>
-                        <a:rPr lang="en-US" sz="1100">
+                        <a:rPr lang="en-US" sz="1600">
                           <a:effectLst/>
+                          <a:latin typeface="Tahoma" charset="0"/>
+                          <a:ea typeface="Tahoma" charset="0"/>
+                          <a:cs typeface="Tahoma" charset="0"/>
                         </a:rPr>
                         <a:t>ADJP, PP, SBAR</a:t>
                       </a:r>
-                      <a:endParaRPr lang="en-US" sz="800">
+                      <a:endParaRPr lang="en-US" sz="1600">
                         <a:solidFill>
                           <a:srgbClr val="000000"/>
                         </a:solidFill>
                         <a:effectLst/>
-                        <a:latin typeface="Helvetica" charset="0"/>
-                        <a:ea typeface="Arial Unicode MS" charset="0"/>
-                        <a:cs typeface="Arial Unicode MS" charset="0"/>
+                        <a:latin typeface="Tahoma" charset="0"/>
+                        <a:ea typeface="Tahoma" charset="0"/>
+                        <a:cs typeface="Tahoma" charset="0"/>
                       </a:endParaRPr>
                     </a:p>
                   </a:txBody>
-                  <a:tcPr marL="51435" marR="51435" marT="0" marB="0"/>
+                  <a:tcPr marL="54341" marR="54341" marT="0" marB="0"/>
                 </a:tc>
                 <a:tc>
                   <a:txBody>
@@ -6959,39 +6511,45 @@
                     <a:p>
                       <a:pPr>
                         <a:lnSpc>
-                          <a:spcPct val="150000"/>
+                          <a:spcPct val="100000"/>
                         </a:lnSpc>
                         <a:spcAft>
                           <a:spcPts val="0"/>
                         </a:spcAft>
                       </a:pPr>
                       <a:r>
-                        <a:rPr lang="ru-RU" sz="1100" dirty="0" smtClean="0">
+                        <a:rPr lang="ru-RU" sz="1600" dirty="0" smtClean="0">
                           <a:effectLst/>
+                          <a:latin typeface="Tahoma" charset="0"/>
+                          <a:ea typeface="Tahoma" charset="0"/>
+                          <a:cs typeface="Tahoma" charset="0"/>
                         </a:rPr>
                         <a:t>Дополнительная информация для зависимостей между классами, которая влияет</a:t>
                       </a:r>
                       <a:r>
-                        <a:rPr lang="ru-RU" sz="1100" baseline="0" dirty="0" smtClean="0">
+                        <a:rPr lang="ru-RU" sz="1600" baseline="0" dirty="0" smtClean="0">
                           <a:effectLst/>
+                          <a:latin typeface="Tahoma" charset="0"/>
+                          <a:ea typeface="Tahoma" charset="0"/>
+                          <a:cs typeface="Tahoma" charset="0"/>
                         </a:rPr>
                         <a:t> на их последующую конвертацию</a:t>
                       </a:r>
-                      <a:endParaRPr lang="en-US" sz="800" dirty="0">
+                      <a:endParaRPr lang="en-US" sz="1600" dirty="0">
                         <a:solidFill>
                           <a:srgbClr val="000000"/>
                         </a:solidFill>
                         <a:effectLst/>
-                        <a:latin typeface="Helvetica" charset="0"/>
-                        <a:ea typeface="Arial Unicode MS" charset="0"/>
-                        <a:cs typeface="Arial Unicode MS" charset="0"/>
+                        <a:latin typeface="Tahoma" charset="0"/>
+                        <a:ea typeface="Tahoma" charset="0"/>
+                        <a:cs typeface="Tahoma" charset="0"/>
                       </a:endParaRPr>
                     </a:p>
                   </a:txBody>
-                  <a:tcPr marL="51435" marR="51435" marT="0" marB="0"/>
+                  <a:tcPr marL="54341" marR="54341" marT="0" marB="0"/>
                 </a:tc>
               </a:tr>
-              <a:tr h="944279">
+              <a:tr h="997622">
                 <a:tc>
                   <a:txBody>
                     <a:bodyPr/>
@@ -6999,30 +6557,33 @@
                     <a:p>
                       <a:pPr>
                         <a:lnSpc>
-                          <a:spcPct val="150000"/>
+                          <a:spcPct val="100000"/>
                         </a:lnSpc>
                         <a:spcAft>
                           <a:spcPts val="0"/>
                         </a:spcAft>
                       </a:pPr>
                       <a:r>
-                        <a:rPr lang="en-US" sz="1100">
+                        <a:rPr lang="en-US" sz="1600">
                           <a:effectLst/>
+                          <a:latin typeface="Tahoma" charset="0"/>
+                          <a:ea typeface="Tahoma" charset="0"/>
+                          <a:cs typeface="Tahoma" charset="0"/>
                         </a:rPr>
                         <a:t>IN</a:t>
                       </a:r>
-                      <a:endParaRPr lang="en-US" sz="800">
+                      <a:endParaRPr lang="en-US" sz="1600">
                         <a:solidFill>
                           <a:srgbClr val="000000"/>
                         </a:solidFill>
                         <a:effectLst/>
-                        <a:latin typeface="Helvetica" charset="0"/>
-                        <a:ea typeface="Arial Unicode MS" charset="0"/>
-                        <a:cs typeface="Arial Unicode MS" charset="0"/>
+                        <a:latin typeface="Tahoma" charset="0"/>
+                        <a:ea typeface="Tahoma" charset="0"/>
+                        <a:cs typeface="Tahoma" charset="0"/>
                       </a:endParaRPr>
                     </a:p>
                   </a:txBody>
-                  <a:tcPr marL="51435" marR="51435" marT="0" marB="0"/>
+                  <a:tcPr marL="54341" marR="54341" marT="0" marB="0"/>
                 </a:tc>
                 <a:tc>
                   <a:txBody>
@@ -7031,51 +6592,63 @@
                     <a:p>
                       <a:pPr>
                         <a:lnSpc>
-                          <a:spcPct val="150000"/>
+                          <a:spcPct val="100000"/>
                         </a:lnSpc>
                         <a:spcAft>
                           <a:spcPts val="0"/>
                         </a:spcAft>
                       </a:pPr>
                       <a:r>
-                        <a:rPr lang="ru-RU" sz="1100" dirty="0" smtClean="0">
+                        <a:rPr lang="ru-RU" sz="1600" dirty="0" smtClean="0">
                           <a:effectLst/>
+                          <a:latin typeface="Tahoma" charset="0"/>
+                          <a:ea typeface="Tahoma" charset="0"/>
+                          <a:cs typeface="Tahoma" charset="0"/>
                         </a:rPr>
                         <a:t>Указывает на агрегацию</a:t>
                       </a:r>
                       <a:r>
-                        <a:rPr lang="ru-RU" sz="1100" baseline="0" dirty="0" smtClean="0">
+                        <a:rPr lang="ru-RU" sz="1600" baseline="0" dirty="0" smtClean="0">
                           <a:effectLst/>
+                          <a:latin typeface="Tahoma" charset="0"/>
+                          <a:ea typeface="Tahoma" charset="0"/>
+                          <a:cs typeface="Tahoma" charset="0"/>
                         </a:rPr>
                         <a:t> </a:t>
                       </a:r>
                       <a:r>
-                        <a:rPr lang="ru-RU" sz="1100" dirty="0" smtClean="0">
+                        <a:rPr lang="ru-RU" sz="1600" dirty="0" smtClean="0">
                           <a:effectLst/>
+                          <a:latin typeface="Tahoma" charset="0"/>
+                          <a:ea typeface="Tahoma" charset="0"/>
+                          <a:cs typeface="Tahoma" charset="0"/>
                         </a:rPr>
                         <a:t>или генерализацию в зависимости</a:t>
                       </a:r>
                       <a:r>
-                        <a:rPr lang="ru-RU" sz="1100" baseline="0" dirty="0" smtClean="0">
+                        <a:rPr lang="ru-RU" sz="1600" baseline="0" dirty="0" smtClean="0">
                           <a:effectLst/>
+                          <a:latin typeface="Tahoma" charset="0"/>
+                          <a:ea typeface="Tahoma" charset="0"/>
+                          <a:cs typeface="Tahoma" charset="0"/>
                         </a:rPr>
                         <a:t> контекста</a:t>
                       </a:r>
-                      <a:endParaRPr lang="en-US" sz="800" dirty="0">
+                      <a:endParaRPr lang="en-US" sz="1600" dirty="0">
                         <a:solidFill>
                           <a:srgbClr val="000000"/>
                         </a:solidFill>
                         <a:effectLst/>
-                        <a:latin typeface="Helvetica" charset="0"/>
-                        <a:ea typeface="Arial Unicode MS" charset="0"/>
-                        <a:cs typeface="Arial Unicode MS" charset="0"/>
+                        <a:latin typeface="Tahoma" charset="0"/>
+                        <a:ea typeface="Tahoma" charset="0"/>
+                        <a:cs typeface="Tahoma" charset="0"/>
                       </a:endParaRPr>
                     </a:p>
                   </a:txBody>
-                  <a:tcPr marL="51435" marR="51435" marT="0" marB="0"/>
+                  <a:tcPr marL="54341" marR="54341" marT="0" marB="0"/>
                 </a:tc>
               </a:tr>
-              <a:tr h="629519">
+              <a:tr h="665081">
                 <a:tc>
                   <a:txBody>
                     <a:bodyPr/>
@@ -7083,30 +6656,33 @@
                     <a:p>
                       <a:pPr>
                         <a:lnSpc>
-                          <a:spcPct val="150000"/>
+                          <a:spcPct val="100000"/>
                         </a:lnSpc>
                         <a:spcAft>
                           <a:spcPts val="0"/>
                         </a:spcAft>
                       </a:pPr>
                       <a:r>
-                        <a:rPr lang="en-US" sz="1100">
+                        <a:rPr lang="en-US" sz="1600">
                           <a:effectLst/>
+                          <a:latin typeface="Tahoma" charset="0"/>
+                          <a:ea typeface="Tahoma" charset="0"/>
+                          <a:cs typeface="Tahoma" charset="0"/>
                         </a:rPr>
                         <a:t>СС</a:t>
                       </a:r>
-                      <a:endParaRPr lang="en-US" sz="800">
+                      <a:endParaRPr lang="en-US" sz="1600">
                         <a:solidFill>
                           <a:srgbClr val="000000"/>
                         </a:solidFill>
                         <a:effectLst/>
-                        <a:latin typeface="Helvetica" charset="0"/>
-                        <a:ea typeface="Arial Unicode MS" charset="0"/>
-                        <a:cs typeface="Arial Unicode MS" charset="0"/>
+                        <a:latin typeface="Tahoma" charset="0"/>
+                        <a:ea typeface="Tahoma" charset="0"/>
+                        <a:cs typeface="Tahoma" charset="0"/>
                       </a:endParaRPr>
                     </a:p>
                   </a:txBody>
-                  <a:tcPr marL="51435" marR="51435" marT="0" marB="0"/>
+                  <a:tcPr marL="54341" marR="54341" marT="0" marB="0"/>
                 </a:tc>
                 <a:tc>
                   <a:txBody>
@@ -7115,36 +6691,42 @@
                     <a:p>
                       <a:pPr>
                         <a:lnSpc>
-                          <a:spcPct val="150000"/>
+                          <a:spcPct val="100000"/>
                         </a:lnSpc>
                         <a:spcAft>
                           <a:spcPts val="0"/>
                         </a:spcAft>
                       </a:pPr>
                       <a:r>
-                        <a:rPr lang="ru-RU" sz="1100" dirty="0" smtClean="0">
+                        <a:rPr lang="ru-RU" sz="1600" dirty="0" smtClean="0">
                           <a:effectLst/>
+                          <a:latin typeface="Tahoma" charset="0"/>
+                          <a:ea typeface="Tahoma" charset="0"/>
+                          <a:cs typeface="Tahoma" charset="0"/>
                         </a:rPr>
                         <a:t>Соединение одинаковых</a:t>
                       </a:r>
                       <a:r>
-                        <a:rPr lang="ru-RU" sz="1100" baseline="0" dirty="0" smtClean="0">
+                        <a:rPr lang="ru-RU" sz="1600" baseline="0" dirty="0" smtClean="0">
                           <a:effectLst/>
+                          <a:latin typeface="Tahoma" charset="0"/>
+                          <a:ea typeface="Tahoma" charset="0"/>
+                          <a:cs typeface="Tahoma" charset="0"/>
                         </a:rPr>
                         <a:t> по типу зависимостей</a:t>
                       </a:r>
-                      <a:endParaRPr lang="en-US" sz="800" dirty="0">
+                      <a:endParaRPr lang="en-US" sz="1600" dirty="0">
                         <a:solidFill>
                           <a:srgbClr val="000000"/>
                         </a:solidFill>
                         <a:effectLst/>
-                        <a:latin typeface="Helvetica" charset="0"/>
-                        <a:ea typeface="Arial Unicode MS" charset="0"/>
-                        <a:cs typeface="Arial Unicode MS" charset="0"/>
+                        <a:latin typeface="Tahoma" charset="0"/>
+                        <a:ea typeface="Tahoma" charset="0"/>
+                        <a:cs typeface="Tahoma" charset="0"/>
                       </a:endParaRPr>
                     </a:p>
                   </a:txBody>
-                  <a:tcPr marL="51435" marR="51435" marT="0" marB="0"/>
+                  <a:tcPr marL="54341" marR="54341" marT="0" marB="0"/>
                 </a:tc>
               </a:tr>
             </a:tbl>
@@ -7198,72 +6780,804 @@
             <p:ph type="title"/>
           </p:nvPr>
         </p:nvSpPr>
-        <p:spPr/>
+        <p:spPr>
+          <a:xfrm>
+            <a:off x="967440" y="567671"/>
+            <a:ext cx="7196850" cy="782189"/>
+          </a:xfrm>
+        </p:spPr>
         <p:txBody>
           <a:bodyPr>
-            <a:normAutofit fontScale="90000"/>
+            <a:noAutofit/>
           </a:bodyPr>
           <a:lstStyle/>
           <a:p>
-            <a:r>
-              <a:rPr lang="ru-RU" dirty="0" smtClean="0"/>
-              <a:t>Одна из составляющих частей проекта редактора онтологий</a:t>
-            </a:r>
-            <a:endParaRPr lang="en-US" dirty="0"/>
-          </a:p>
-        </p:txBody>
-      </p:sp>
-      <p:sp>
-        <p:nvSpPr>
-          <p:cNvPr id="3" name="Content Placeholder 2"/>
-          <p:cNvSpPr>
-            <a:spLocks noGrp="1"/>
-          </p:cNvSpPr>
-          <p:nvPr>
-            <p:ph idx="1"/>
-          </p:nvPr>
+            <a:pPr algn="r"/>
+            <a:r>
+              <a:rPr lang="ru-RU" sz="2400" dirty="0">
+                <a:ea typeface="Helvetica Neue" charset="0"/>
+                <a:cs typeface="Helvetica Neue" charset="0"/>
+              </a:rPr>
+              <a:t>Короткие семантически насыщенные тексты</a:t>
+            </a:r>
+            <a:endParaRPr lang="en-US" sz="2400" dirty="0">
+              <a:ea typeface="Helvetica Neue" charset="0"/>
+              <a:cs typeface="Helvetica Neue" charset="0"/>
+            </a:endParaRPr>
+          </a:p>
+        </p:txBody>
+      </p:sp>
+      <p:sp>
+        <p:nvSpPr>
+          <p:cNvPr id="6" name="TextBox 5"/>
+          <p:cNvSpPr txBox="1"/>
+          <p:nvPr/>
         </p:nvSpPr>
         <p:spPr>
           <a:xfrm>
-            <a:off x="946403" y="1828801"/>
-            <a:ext cx="7103087" cy="4488872"/>
+            <a:off x="647700" y="1376287"/>
+            <a:ext cx="7516589" cy="530915"/>
           </a:xfrm>
+          <a:prstGeom prst="rect">
+            <a:avLst/>
+          </a:prstGeom>
+          <a:noFill/>
         </p:spPr>
         <p:txBody>
-          <a:bodyPr/>
+          <a:bodyPr wrap="square" rtlCol="0">
+            <a:spAutoFit/>
+          </a:bodyPr>
           <a:lstStyle/>
           <a:p>
-            <a:pPr marL="0" marR="0" lvl="0" indent="0" defTabSz="914400" eaLnBrk="1" fontAlgn="auto" latinLnBrk="0" hangingPunct="1">
-              <a:lnSpc>
-                <a:spcPct val="100000"/>
-              </a:lnSpc>
-              <a:spcBef>
-                <a:spcPts val="0"/>
-              </a:spcBef>
-              <a:spcAft>
-                <a:spcPts val="0"/>
-              </a:spcAft>
-              <a:buClrTx/>
-              <a:buSzTx/>
-              <a:buFontTx/>
-              <a:buNone/>
-              <a:tabLst/>
-              <a:defRPr/>
-            </a:pPr>
-            <a:endParaRPr lang="en-US" dirty="0"/>
-          </a:p>
-        </p:txBody>
-      </p:sp>
+            <a:r>
+              <a:rPr lang="en-US" sz="1500" dirty="0">
+                <a:latin typeface="Tahoma" charset="0"/>
+                <a:ea typeface="Tahoma" charset="0"/>
+                <a:cs typeface="Tahoma" charset="0"/>
+              </a:rPr>
+              <a:t>A Clock is a </a:t>
+            </a:r>
+            <a:r>
+              <a:rPr lang="en-US" sz="1500" dirty="0" err="1">
+                <a:latin typeface="Tahoma" charset="0"/>
+                <a:ea typeface="Tahoma" charset="0"/>
+                <a:cs typeface="Tahoma" charset="0"/>
+              </a:rPr>
+              <a:t>TemporalInstrument</a:t>
+            </a:r>
+            <a:r>
+              <a:rPr lang="en-US" sz="1500" dirty="0">
+                <a:latin typeface="Tahoma" charset="0"/>
+                <a:ea typeface="Tahoma" charset="0"/>
+                <a:cs typeface="Tahoma" charset="0"/>
+              </a:rPr>
+              <a:t> to </a:t>
+            </a:r>
+            <a:r>
+              <a:rPr lang="en-US" sz="1500" dirty="0" smtClean="0">
+                <a:latin typeface="Tahoma" charset="0"/>
+                <a:ea typeface="Tahoma" charset="0"/>
+                <a:cs typeface="Tahoma" charset="0"/>
+              </a:rPr>
+              <a:t>generate </a:t>
+            </a:r>
+            <a:r>
+              <a:rPr lang="en-US" sz="1500" dirty="0" smtClean="0">
+                <a:latin typeface="Tahoma" charset="0"/>
+                <a:ea typeface="Tahoma" charset="0"/>
+                <a:cs typeface="Tahoma" charset="0"/>
+              </a:rPr>
+              <a:t>the </a:t>
+            </a:r>
+            <a:r>
+              <a:rPr lang="en-US" sz="1500" dirty="0">
+                <a:latin typeface="Tahoma" charset="0"/>
+                <a:ea typeface="Tahoma" charset="0"/>
+                <a:cs typeface="Tahoma" charset="0"/>
+              </a:rPr>
+              <a:t>instances of a </a:t>
+            </a:r>
+            <a:r>
+              <a:rPr lang="en-US" sz="1500" dirty="0" err="1">
+                <a:latin typeface="Tahoma" charset="0"/>
+                <a:ea typeface="Tahoma" charset="0"/>
+                <a:cs typeface="Tahoma" charset="0"/>
+              </a:rPr>
+              <a:t>TemporalMeasure</a:t>
+            </a:r>
+            <a:r>
+              <a:rPr lang="en-US" sz="1500" dirty="0">
+                <a:latin typeface="+mj-lt"/>
+                <a:ea typeface="Helvetica Neue" charset="0"/>
+                <a:cs typeface="Helvetica Neue" charset="0"/>
+              </a:rPr>
+              <a:t>. </a:t>
+            </a:r>
+            <a:endParaRPr lang="en-US" sz="1500" b="1" dirty="0">
+              <a:latin typeface="+mj-lt"/>
+              <a:ea typeface="Helvetica Neue" charset="0"/>
+              <a:cs typeface="Helvetica Neue" charset="0"/>
+            </a:endParaRPr>
+          </a:p>
+          <a:p>
+            <a:endParaRPr lang="en-US" sz="1350" dirty="0"/>
+          </a:p>
+        </p:txBody>
+      </p:sp>
+      <p:sp>
+        <p:nvSpPr>
+          <p:cNvPr id="8" name="TextBox 7"/>
+          <p:cNvSpPr txBox="1"/>
+          <p:nvPr/>
+        </p:nvSpPr>
+        <p:spPr>
+          <a:xfrm>
+            <a:off x="647701" y="513862"/>
+            <a:ext cx="406400" cy="600164"/>
+          </a:xfrm>
+          <a:prstGeom prst="rect">
+            <a:avLst/>
+          </a:prstGeom>
+          <a:noFill/>
+        </p:spPr>
+        <p:txBody>
+          <a:bodyPr wrap="square" rtlCol="0">
+            <a:spAutoFit/>
+          </a:bodyPr>
+          <a:lstStyle/>
+          <a:p>
+            <a:r>
+              <a:rPr lang="ru-RU" sz="3300" b="1" dirty="0">
+                <a:solidFill>
+                  <a:schemeClr val="accent1"/>
+                </a:solidFill>
+              </a:rPr>
+              <a:t>3</a:t>
+            </a:r>
+            <a:endParaRPr lang="en-US" sz="3300" b="1" dirty="0">
+              <a:solidFill>
+                <a:schemeClr val="accent1"/>
+              </a:solidFill>
+            </a:endParaRPr>
+          </a:p>
+        </p:txBody>
+      </p:sp>
+      <p:sp>
+        <p:nvSpPr>
+          <p:cNvPr id="7" name="TextBox 6"/>
+          <p:cNvSpPr txBox="1"/>
+          <p:nvPr/>
+        </p:nvSpPr>
+        <p:spPr>
+          <a:xfrm>
+            <a:off x="445218" y="3177777"/>
+            <a:ext cx="4425447" cy="2893100"/>
+          </a:xfrm>
+          <a:prstGeom prst="rect">
+            <a:avLst/>
+          </a:prstGeom>
+          <a:noFill/>
+        </p:spPr>
+        <p:txBody>
+          <a:bodyPr wrap="square" rtlCol="0">
+            <a:spAutoFit/>
+          </a:bodyPr>
+          <a:lstStyle/>
+          <a:p>
+            <a:r>
+              <a:rPr lang="mr-IN" sz="1400" dirty="0">
+                <a:latin typeface="Tahoma" charset="0"/>
+                <a:ea typeface="Tahoma" charset="0"/>
+                <a:cs typeface="Tahoma" charset="0"/>
+              </a:rPr>
+              <a:t>(ROOT </a:t>
+            </a:r>
+            <a:endParaRPr lang="ru-RU" sz="1400" dirty="0" smtClean="0">
+              <a:latin typeface="Tahoma" charset="0"/>
+              <a:ea typeface="Tahoma" charset="0"/>
+              <a:cs typeface="Tahoma" charset="0"/>
+            </a:endParaRPr>
+          </a:p>
+          <a:p>
+            <a:r>
+              <a:rPr lang="ru-RU" sz="1400" dirty="0">
+                <a:latin typeface="Tahoma" charset="0"/>
+                <a:ea typeface="Tahoma" charset="0"/>
+                <a:cs typeface="Tahoma" charset="0"/>
+              </a:rPr>
+              <a:t> </a:t>
+            </a:r>
+            <a:r>
+              <a:rPr lang="ru-RU" sz="1400" dirty="0" smtClean="0">
+                <a:latin typeface="Tahoma" charset="0"/>
+                <a:ea typeface="Tahoma" charset="0"/>
+                <a:cs typeface="Tahoma" charset="0"/>
+              </a:rPr>
+              <a:t> </a:t>
+            </a:r>
+            <a:r>
+              <a:rPr lang="mr-IN" sz="1400" dirty="0" smtClean="0">
+                <a:latin typeface="Tahoma" charset="0"/>
+                <a:ea typeface="Tahoma" charset="0"/>
+                <a:cs typeface="Tahoma" charset="0"/>
+              </a:rPr>
+              <a:t>(</a:t>
+            </a:r>
+            <a:r>
+              <a:rPr lang="mr-IN" sz="1400" dirty="0" err="1" smtClean="0">
+                <a:latin typeface="Tahoma" charset="0"/>
+                <a:ea typeface="Tahoma" charset="0"/>
+                <a:cs typeface="Tahoma" charset="0"/>
+              </a:rPr>
+              <a:t>S</a:t>
+            </a:r>
+            <a:r>
+              <a:rPr lang="mr-IN" sz="1400" dirty="0" smtClean="0">
+                <a:latin typeface="Tahoma" charset="0"/>
+                <a:ea typeface="Tahoma" charset="0"/>
+                <a:cs typeface="Tahoma" charset="0"/>
+              </a:rPr>
+              <a:t>    </a:t>
+            </a:r>
+            <a:endParaRPr lang="ru-RU" sz="1400" dirty="0" smtClean="0">
+              <a:latin typeface="Tahoma" charset="0"/>
+              <a:ea typeface="Tahoma" charset="0"/>
+              <a:cs typeface="Tahoma" charset="0"/>
+            </a:endParaRPr>
+          </a:p>
+          <a:p>
+            <a:r>
+              <a:rPr lang="ru-RU" sz="1400" dirty="0" smtClean="0">
+                <a:latin typeface="Tahoma" charset="0"/>
+                <a:ea typeface="Tahoma" charset="0"/>
+                <a:cs typeface="Tahoma" charset="0"/>
+              </a:rPr>
+              <a:t>    </a:t>
+            </a:r>
+            <a:r>
+              <a:rPr lang="mr-IN" sz="1400" dirty="0" smtClean="0">
+                <a:latin typeface="Tahoma" charset="0"/>
+                <a:ea typeface="Tahoma" charset="0"/>
+                <a:cs typeface="Tahoma" charset="0"/>
+              </a:rPr>
+              <a:t>(</a:t>
+            </a:r>
+            <a:r>
+              <a:rPr lang="mr-IN" sz="1400" dirty="0">
+                <a:latin typeface="Tahoma" charset="0"/>
+                <a:ea typeface="Tahoma" charset="0"/>
+                <a:cs typeface="Tahoma" charset="0"/>
+              </a:rPr>
+              <a:t>NP (DT </a:t>
+            </a:r>
+            <a:r>
+              <a:rPr lang="mr-IN" sz="1400" dirty="0" err="1">
+                <a:latin typeface="Tahoma" charset="0"/>
+                <a:ea typeface="Tahoma" charset="0"/>
+                <a:cs typeface="Tahoma" charset="0"/>
+              </a:rPr>
+              <a:t>A</a:t>
+            </a:r>
+            <a:r>
+              <a:rPr lang="mr-IN" sz="1400" dirty="0">
+                <a:latin typeface="Tahoma" charset="0"/>
+                <a:ea typeface="Tahoma" charset="0"/>
+                <a:cs typeface="Tahoma" charset="0"/>
+              </a:rPr>
+              <a:t>) (NN </a:t>
+            </a:r>
+            <a:r>
+              <a:rPr lang="mr-IN" sz="1400" dirty="0" err="1">
+                <a:latin typeface="Tahoma" charset="0"/>
+                <a:ea typeface="Tahoma" charset="0"/>
+                <a:cs typeface="Tahoma" charset="0"/>
+              </a:rPr>
+              <a:t>Clock</a:t>
+            </a:r>
+            <a:r>
+              <a:rPr lang="mr-IN" sz="1400" dirty="0">
+                <a:latin typeface="Tahoma" charset="0"/>
+                <a:ea typeface="Tahoma" charset="0"/>
+                <a:cs typeface="Tahoma" charset="0"/>
+              </a:rPr>
+              <a:t>))   </a:t>
+            </a:r>
+            <a:endParaRPr lang="ru-RU" sz="1400" dirty="0" smtClean="0">
+              <a:latin typeface="Tahoma" charset="0"/>
+              <a:ea typeface="Tahoma" charset="0"/>
+              <a:cs typeface="Tahoma" charset="0"/>
+            </a:endParaRPr>
+          </a:p>
+          <a:p>
+            <a:r>
+              <a:rPr lang="mr-IN" sz="1400" dirty="0" smtClean="0">
+                <a:latin typeface="Tahoma" charset="0"/>
+                <a:ea typeface="Tahoma" charset="0"/>
+                <a:cs typeface="Tahoma" charset="0"/>
+              </a:rPr>
+              <a:t> </a:t>
+            </a:r>
+            <a:r>
+              <a:rPr lang="ru-RU" sz="1400" dirty="0" smtClean="0">
+                <a:latin typeface="Tahoma" charset="0"/>
+                <a:ea typeface="Tahoma" charset="0"/>
+                <a:cs typeface="Tahoma" charset="0"/>
+              </a:rPr>
+              <a:t>   </a:t>
+            </a:r>
+            <a:r>
+              <a:rPr lang="mr-IN" sz="1400" dirty="0" smtClean="0">
+                <a:latin typeface="Tahoma" charset="0"/>
+                <a:ea typeface="Tahoma" charset="0"/>
+                <a:cs typeface="Tahoma" charset="0"/>
+              </a:rPr>
+              <a:t>(</a:t>
+            </a:r>
+            <a:r>
+              <a:rPr lang="mr-IN" sz="1400" dirty="0">
+                <a:latin typeface="Tahoma" charset="0"/>
+                <a:ea typeface="Tahoma" charset="0"/>
+                <a:cs typeface="Tahoma" charset="0"/>
+              </a:rPr>
+              <a:t>VP (VBZ </a:t>
+            </a:r>
+            <a:r>
+              <a:rPr lang="mr-IN" sz="1400" dirty="0" err="1">
+                <a:latin typeface="Tahoma" charset="0"/>
+                <a:ea typeface="Tahoma" charset="0"/>
+                <a:cs typeface="Tahoma" charset="0"/>
+              </a:rPr>
+              <a:t>is</a:t>
+            </a:r>
+            <a:r>
+              <a:rPr lang="mr-IN" sz="1400" dirty="0">
+                <a:latin typeface="Tahoma" charset="0"/>
+                <a:ea typeface="Tahoma" charset="0"/>
+                <a:cs typeface="Tahoma" charset="0"/>
+              </a:rPr>
+              <a:t>)    </a:t>
+            </a:r>
+            <a:endParaRPr lang="ru-RU" sz="1400" dirty="0" smtClean="0">
+              <a:latin typeface="Tahoma" charset="0"/>
+              <a:ea typeface="Tahoma" charset="0"/>
+              <a:cs typeface="Tahoma" charset="0"/>
+            </a:endParaRPr>
+          </a:p>
+          <a:p>
+            <a:r>
+              <a:rPr lang="ru-RU" sz="1400" dirty="0">
+                <a:latin typeface="Tahoma" charset="0"/>
+                <a:ea typeface="Tahoma" charset="0"/>
+                <a:cs typeface="Tahoma" charset="0"/>
+              </a:rPr>
+              <a:t> </a:t>
+            </a:r>
+            <a:r>
+              <a:rPr lang="ru-RU" sz="1400" dirty="0" smtClean="0">
+                <a:latin typeface="Tahoma" charset="0"/>
+                <a:ea typeface="Tahoma" charset="0"/>
+                <a:cs typeface="Tahoma" charset="0"/>
+              </a:rPr>
+              <a:t>   </a:t>
+            </a:r>
+            <a:r>
+              <a:rPr lang="mr-IN" sz="1400" dirty="0" smtClean="0">
+                <a:latin typeface="Tahoma" charset="0"/>
+                <a:ea typeface="Tahoma" charset="0"/>
+                <a:cs typeface="Tahoma" charset="0"/>
+              </a:rPr>
+              <a:t>  </a:t>
+            </a:r>
+            <a:r>
+              <a:rPr lang="mr-IN" sz="1400" dirty="0">
+                <a:latin typeface="Tahoma" charset="0"/>
+                <a:ea typeface="Tahoma" charset="0"/>
+                <a:cs typeface="Tahoma" charset="0"/>
+              </a:rPr>
+              <a:t>(NP (DT </a:t>
+            </a:r>
+            <a:r>
+              <a:rPr lang="mr-IN" sz="1400" dirty="0" err="1">
+                <a:latin typeface="Tahoma" charset="0"/>
+                <a:ea typeface="Tahoma" charset="0"/>
+                <a:cs typeface="Tahoma" charset="0"/>
+              </a:rPr>
+              <a:t>a</a:t>
+            </a:r>
+            <a:r>
+              <a:rPr lang="mr-IN" sz="1400" dirty="0">
+                <a:latin typeface="Tahoma" charset="0"/>
+                <a:ea typeface="Tahoma" charset="0"/>
+                <a:cs typeface="Tahoma" charset="0"/>
+              </a:rPr>
+              <a:t>) (NN </a:t>
+            </a:r>
+            <a:r>
+              <a:rPr lang="mr-IN" sz="1400" dirty="0" err="1">
+                <a:latin typeface="Tahoma" charset="0"/>
+                <a:ea typeface="Tahoma" charset="0"/>
+                <a:cs typeface="Tahoma" charset="0"/>
+              </a:rPr>
+              <a:t>TemporalInstrument</a:t>
+            </a:r>
+            <a:r>
+              <a:rPr lang="mr-IN" sz="1400" dirty="0">
+                <a:latin typeface="Tahoma" charset="0"/>
+                <a:ea typeface="Tahoma" charset="0"/>
+                <a:cs typeface="Tahoma" charset="0"/>
+              </a:rPr>
+              <a:t>)       </a:t>
+            </a:r>
+            <a:endParaRPr lang="ru-RU" sz="1400" dirty="0" smtClean="0">
+              <a:latin typeface="Tahoma" charset="0"/>
+              <a:ea typeface="Tahoma" charset="0"/>
+              <a:cs typeface="Tahoma" charset="0"/>
+            </a:endParaRPr>
+          </a:p>
+          <a:p>
+            <a:r>
+              <a:rPr lang="mr-IN" sz="1400" dirty="0" smtClean="0">
+                <a:latin typeface="Tahoma" charset="0"/>
+                <a:ea typeface="Tahoma" charset="0"/>
+                <a:cs typeface="Tahoma" charset="0"/>
+              </a:rPr>
+              <a:t> </a:t>
+            </a:r>
+            <a:r>
+              <a:rPr lang="ru-RU" sz="1400" dirty="0" smtClean="0">
+                <a:latin typeface="Tahoma" charset="0"/>
+                <a:ea typeface="Tahoma" charset="0"/>
+                <a:cs typeface="Tahoma" charset="0"/>
+              </a:rPr>
+              <a:t>       </a:t>
+            </a:r>
+            <a:r>
+              <a:rPr lang="mr-IN" sz="1400" dirty="0" smtClean="0">
+                <a:latin typeface="Tahoma" charset="0"/>
+                <a:ea typeface="Tahoma" charset="0"/>
+                <a:cs typeface="Tahoma" charset="0"/>
+              </a:rPr>
+              <a:t>(</a:t>
+            </a:r>
+            <a:r>
+              <a:rPr lang="mr-IN" sz="1400" dirty="0" err="1">
+                <a:latin typeface="Tahoma" charset="0"/>
+                <a:ea typeface="Tahoma" charset="0"/>
+                <a:cs typeface="Tahoma" charset="0"/>
+              </a:rPr>
+              <a:t>S</a:t>
+            </a:r>
+            <a:r>
+              <a:rPr lang="mr-IN" sz="1400" dirty="0">
+                <a:latin typeface="Tahoma" charset="0"/>
+                <a:ea typeface="Tahoma" charset="0"/>
+                <a:cs typeface="Tahoma" charset="0"/>
+              </a:rPr>
+              <a:t> </a:t>
+            </a:r>
+            <a:endParaRPr lang="ru-RU" sz="1400" dirty="0" smtClean="0">
+              <a:latin typeface="Tahoma" charset="0"/>
+              <a:ea typeface="Tahoma" charset="0"/>
+              <a:cs typeface="Tahoma" charset="0"/>
+            </a:endParaRPr>
+          </a:p>
+          <a:p>
+            <a:r>
+              <a:rPr lang="mr-IN" sz="1400" dirty="0" smtClean="0">
+                <a:latin typeface="Tahoma" charset="0"/>
+                <a:ea typeface="Tahoma" charset="0"/>
+                <a:cs typeface="Tahoma" charset="0"/>
+              </a:rPr>
+              <a:t>         </a:t>
+            </a:r>
+            <a:r>
+              <a:rPr lang="mr-IN" sz="1400" dirty="0">
+                <a:latin typeface="Tahoma" charset="0"/>
+                <a:ea typeface="Tahoma" charset="0"/>
+                <a:cs typeface="Tahoma" charset="0"/>
+              </a:rPr>
+              <a:t>(VP (TO to)           </a:t>
+            </a:r>
+            <a:endParaRPr lang="ru-RU" sz="1400" dirty="0" smtClean="0">
+              <a:latin typeface="Tahoma" charset="0"/>
+              <a:ea typeface="Tahoma" charset="0"/>
+              <a:cs typeface="Tahoma" charset="0"/>
+            </a:endParaRPr>
+          </a:p>
+          <a:p>
+            <a:r>
+              <a:rPr lang="ru-RU" sz="1400" dirty="0" smtClean="0">
+                <a:latin typeface="Tahoma" charset="0"/>
+                <a:ea typeface="Tahoma" charset="0"/>
+                <a:cs typeface="Tahoma" charset="0"/>
+              </a:rPr>
+              <a:t>          </a:t>
+            </a:r>
+            <a:r>
+              <a:rPr lang="mr-IN" sz="1400" dirty="0" smtClean="0">
+                <a:latin typeface="Tahoma" charset="0"/>
+                <a:ea typeface="Tahoma" charset="0"/>
+                <a:cs typeface="Tahoma" charset="0"/>
+              </a:rPr>
+              <a:t> </a:t>
+            </a:r>
+            <a:r>
+              <a:rPr lang="mr-IN" sz="1400" dirty="0">
+                <a:latin typeface="Tahoma" charset="0"/>
+                <a:ea typeface="Tahoma" charset="0"/>
+                <a:cs typeface="Tahoma" charset="0"/>
+              </a:rPr>
+              <a:t>(VP (VB </a:t>
+            </a:r>
+            <a:r>
+              <a:rPr lang="mr-IN" sz="1400" dirty="0" err="1">
+                <a:latin typeface="Tahoma" charset="0"/>
+                <a:ea typeface="Tahoma" charset="0"/>
+                <a:cs typeface="Tahoma" charset="0"/>
+              </a:rPr>
+              <a:t>generate</a:t>
+            </a:r>
+            <a:r>
+              <a:rPr lang="mr-IN" sz="1400" dirty="0">
+                <a:latin typeface="Tahoma" charset="0"/>
+                <a:ea typeface="Tahoma" charset="0"/>
+                <a:cs typeface="Tahoma" charset="0"/>
+              </a:rPr>
+              <a:t>)             </a:t>
+            </a:r>
+            <a:endParaRPr lang="ru-RU" sz="1400" dirty="0" smtClean="0">
+              <a:latin typeface="Tahoma" charset="0"/>
+              <a:ea typeface="Tahoma" charset="0"/>
+              <a:cs typeface="Tahoma" charset="0"/>
+            </a:endParaRPr>
+          </a:p>
+          <a:p>
+            <a:r>
+              <a:rPr lang="ru-RU" sz="1400" dirty="0" smtClean="0">
+                <a:latin typeface="Tahoma" charset="0"/>
+                <a:ea typeface="Tahoma" charset="0"/>
+                <a:cs typeface="Tahoma" charset="0"/>
+              </a:rPr>
+              <a:t>            </a:t>
+            </a:r>
+            <a:r>
+              <a:rPr lang="mr-IN" sz="1400" dirty="0" smtClean="0">
+                <a:latin typeface="Tahoma" charset="0"/>
+                <a:ea typeface="Tahoma" charset="0"/>
+                <a:cs typeface="Tahoma" charset="0"/>
+              </a:rPr>
+              <a:t> </a:t>
+            </a:r>
+            <a:r>
+              <a:rPr lang="mr-IN" sz="1400" dirty="0">
+                <a:latin typeface="Tahoma" charset="0"/>
+                <a:ea typeface="Tahoma" charset="0"/>
+                <a:cs typeface="Tahoma" charset="0"/>
+              </a:rPr>
+              <a:t>(NP                </a:t>
+            </a:r>
+            <a:endParaRPr lang="ru-RU" sz="1400" dirty="0" smtClean="0">
+              <a:latin typeface="Tahoma" charset="0"/>
+              <a:ea typeface="Tahoma" charset="0"/>
+              <a:cs typeface="Tahoma" charset="0"/>
+            </a:endParaRPr>
+          </a:p>
+          <a:p>
+            <a:r>
+              <a:rPr lang="ru-RU" sz="1400" dirty="0" smtClean="0">
+                <a:latin typeface="Tahoma" charset="0"/>
+                <a:ea typeface="Tahoma" charset="0"/>
+                <a:cs typeface="Tahoma" charset="0"/>
+              </a:rPr>
+              <a:t>               </a:t>
+            </a:r>
+            <a:r>
+              <a:rPr lang="mr-IN" sz="1400" dirty="0" smtClean="0">
+                <a:latin typeface="Tahoma" charset="0"/>
+                <a:ea typeface="Tahoma" charset="0"/>
+                <a:cs typeface="Tahoma" charset="0"/>
+              </a:rPr>
+              <a:t>(</a:t>
+            </a:r>
+            <a:r>
+              <a:rPr lang="mr-IN" sz="1400" dirty="0">
+                <a:latin typeface="Tahoma" charset="0"/>
+                <a:ea typeface="Tahoma" charset="0"/>
+                <a:cs typeface="Tahoma" charset="0"/>
+              </a:rPr>
+              <a:t>NP (DT the) (NNS </a:t>
+            </a:r>
+            <a:r>
+              <a:rPr lang="mr-IN" sz="1400" dirty="0" err="1">
+                <a:latin typeface="Tahoma" charset="0"/>
+                <a:ea typeface="Tahoma" charset="0"/>
+                <a:cs typeface="Tahoma" charset="0"/>
+              </a:rPr>
+              <a:t>instances</a:t>
+            </a:r>
+            <a:r>
+              <a:rPr lang="mr-IN" sz="1400" dirty="0">
+                <a:latin typeface="Tahoma" charset="0"/>
+                <a:ea typeface="Tahoma" charset="0"/>
+                <a:cs typeface="Tahoma" charset="0"/>
+              </a:rPr>
+              <a:t>))                </a:t>
+            </a:r>
+            <a:r>
+              <a:rPr lang="ru-RU" sz="1400" dirty="0" smtClean="0">
+                <a:latin typeface="Tahoma" charset="0"/>
+                <a:ea typeface="Tahoma" charset="0"/>
+                <a:cs typeface="Tahoma" charset="0"/>
+              </a:rPr>
+              <a:t>   </a:t>
+            </a:r>
+          </a:p>
+          <a:p>
+            <a:r>
+              <a:rPr lang="ru-RU" sz="1400" dirty="0" smtClean="0">
+                <a:latin typeface="Tahoma" charset="0"/>
+                <a:ea typeface="Tahoma" charset="0"/>
+                <a:cs typeface="Tahoma" charset="0"/>
+              </a:rPr>
+              <a:t>               </a:t>
+            </a:r>
+            <a:r>
+              <a:rPr lang="mr-IN" sz="1400" dirty="0" smtClean="0">
+                <a:latin typeface="Tahoma" charset="0"/>
+                <a:ea typeface="Tahoma" charset="0"/>
+                <a:cs typeface="Tahoma" charset="0"/>
+              </a:rPr>
+              <a:t>(</a:t>
+            </a:r>
+            <a:r>
+              <a:rPr lang="mr-IN" sz="1400" dirty="0">
+                <a:latin typeface="Tahoma" charset="0"/>
+                <a:ea typeface="Tahoma" charset="0"/>
+                <a:cs typeface="Tahoma" charset="0"/>
+              </a:rPr>
+              <a:t>PP (IN of)                 </a:t>
+            </a:r>
+            <a:endParaRPr lang="ru-RU" sz="1400" dirty="0" smtClean="0">
+              <a:latin typeface="Tahoma" charset="0"/>
+              <a:ea typeface="Tahoma" charset="0"/>
+              <a:cs typeface="Tahoma" charset="0"/>
+            </a:endParaRPr>
+          </a:p>
+          <a:p>
+            <a:r>
+              <a:rPr lang="ru-RU" sz="1400" dirty="0" smtClean="0">
+                <a:latin typeface="Tahoma" charset="0"/>
+                <a:ea typeface="Tahoma" charset="0"/>
+                <a:cs typeface="Tahoma" charset="0"/>
+              </a:rPr>
+              <a:t>	</a:t>
+            </a:r>
+            <a:r>
+              <a:rPr lang="mr-IN" sz="1400" dirty="0" smtClean="0">
+                <a:latin typeface="Tahoma" charset="0"/>
+                <a:ea typeface="Tahoma" charset="0"/>
+                <a:cs typeface="Tahoma" charset="0"/>
+              </a:rPr>
+              <a:t> </a:t>
+            </a:r>
+            <a:r>
+              <a:rPr lang="mr-IN" sz="1400" dirty="0">
+                <a:latin typeface="Tahoma" charset="0"/>
+                <a:ea typeface="Tahoma" charset="0"/>
+                <a:cs typeface="Tahoma" charset="0"/>
+              </a:rPr>
+              <a:t>(NP (DT </a:t>
+            </a:r>
+            <a:r>
+              <a:rPr lang="mr-IN" sz="1400" dirty="0" err="1">
+                <a:latin typeface="Tahoma" charset="0"/>
+                <a:ea typeface="Tahoma" charset="0"/>
+                <a:cs typeface="Tahoma" charset="0"/>
+              </a:rPr>
+              <a:t>a</a:t>
+            </a:r>
+            <a:r>
+              <a:rPr lang="mr-IN" sz="1400" dirty="0">
+                <a:latin typeface="Tahoma" charset="0"/>
+                <a:ea typeface="Tahoma" charset="0"/>
+                <a:cs typeface="Tahoma" charset="0"/>
+              </a:rPr>
+              <a:t>) (NN </a:t>
+            </a:r>
+            <a:r>
+              <a:rPr lang="mr-IN" sz="1400" dirty="0" err="1">
+                <a:latin typeface="Tahoma" charset="0"/>
+                <a:ea typeface="Tahoma" charset="0"/>
+                <a:cs typeface="Tahoma" charset="0"/>
+              </a:rPr>
+              <a:t>TemporalMeasure</a:t>
+            </a:r>
+            <a:r>
+              <a:rPr lang="mr-IN" sz="1400" dirty="0">
+                <a:latin typeface="Tahoma" charset="0"/>
+                <a:ea typeface="Tahoma" charset="0"/>
+                <a:cs typeface="Tahoma" charset="0"/>
+              </a:rPr>
+              <a:t>)))))))))   </a:t>
+            </a:r>
+            <a:endParaRPr lang="ru-RU" sz="1400" dirty="0" smtClean="0">
+              <a:latin typeface="Tahoma" charset="0"/>
+              <a:ea typeface="Tahoma" charset="0"/>
+              <a:cs typeface="Tahoma" charset="0"/>
+            </a:endParaRPr>
+          </a:p>
+          <a:p>
+            <a:r>
+              <a:rPr lang="mr-IN" sz="1400" dirty="0" smtClean="0">
+                <a:latin typeface="Tahoma" charset="0"/>
+                <a:ea typeface="Tahoma" charset="0"/>
+                <a:cs typeface="Tahoma" charset="0"/>
+              </a:rPr>
+              <a:t> </a:t>
+            </a:r>
+            <a:r>
+              <a:rPr lang="mr-IN" sz="1400" dirty="0">
+                <a:latin typeface="Tahoma" charset="0"/>
+                <a:ea typeface="Tahoma" charset="0"/>
+                <a:cs typeface="Tahoma" charset="0"/>
+              </a:rPr>
+              <a:t>(. .)))</a:t>
+            </a:r>
+            <a:endParaRPr lang="en-US" sz="1400" dirty="0">
+              <a:latin typeface="Tahoma" charset="0"/>
+              <a:ea typeface="Tahoma" charset="0"/>
+              <a:cs typeface="Tahoma" charset="0"/>
+            </a:endParaRPr>
+          </a:p>
+        </p:txBody>
+      </p:sp>
+      <p:pic>
+        <p:nvPicPr>
+          <p:cNvPr id="12" name="Picture 11"/>
+          <p:cNvPicPr>
+            <a:picLocks noChangeAspect="1"/>
+          </p:cNvPicPr>
+          <p:nvPr/>
+        </p:nvPicPr>
+        <p:blipFill>
+          <a:blip r:embed="rId2">
+            <a:extLst>
+              <a:ext uri="{28A0092B-C50C-407E-A947-70E740481C1C}">
+                <a14:useLocalDpi xmlns:a14="http://schemas.microsoft.com/office/drawing/2010/main" val="0"/>
+              </a:ext>
+            </a:extLst>
+          </a:blip>
+          <a:stretch>
+            <a:fillRect/>
+          </a:stretch>
+        </p:blipFill>
+        <p:spPr>
+          <a:xfrm>
+            <a:off x="4870665" y="2330727"/>
+            <a:ext cx="4146550" cy="3740150"/>
+          </a:xfrm>
+          <a:prstGeom prst="rect">
+            <a:avLst/>
+          </a:prstGeom>
+        </p:spPr>
+      </p:pic>
     </p:spTree>
     <p:extLst>
       <p:ext uri="{BB962C8B-B14F-4D97-AF65-F5344CB8AC3E}">
-        <p14:creationId xmlns:p14="http://schemas.microsoft.com/office/powerpoint/2010/main" val="2067883585"/>
+        <p14:creationId xmlns:p14="http://schemas.microsoft.com/office/powerpoint/2010/main" val="1887480677"/>
       </p:ext>
     </p:extLst>
   </p:cSld>
   <p:clrMapOvr>
     <a:masterClrMapping/>
   </p:clrMapOvr>
+  <p:timing>
+    <p:tnLst>
+      <p:par>
+        <p:cTn id="1" dur="indefinite" restart="never" nodeType="tmRoot"/>
+      </p:par>
+    </p:tnLst>
+  </p:timing>
 </p:sld>
 </file>
 
@@ -7565,8 +7879,8 @@
         </p:blipFill>
         <p:spPr>
           <a:xfrm>
-            <a:off x="946150" y="2315414"/>
-            <a:ext cx="7082730" cy="3711313"/>
+            <a:off x="946150" y="2136302"/>
+            <a:ext cx="6446838" cy="3653208"/>
           </a:xfrm>
           <a:prstGeom prst="rect">
             <a:avLst/>
@@ -7586,8 +7900,8 @@
         </p:nvSpPr>
         <p:spPr>
           <a:xfrm>
-            <a:off x="1206501" y="1123951"/>
-            <a:ext cx="7213600" cy="923330"/>
+            <a:off x="585158" y="293831"/>
+            <a:ext cx="6807830" cy="954107"/>
           </a:xfrm>
           <a:prstGeom prst="rect">
             <a:avLst/>
@@ -7601,78 +7915,23 @@
           <a:lstStyle/>
           <a:p>
             <a:r>
-              <a:rPr lang="en-US" dirty="0">
-                <a:solidFill>
-                  <a:schemeClr val="tx1">
-                    <a:lumMod val="65000"/>
-                    <a:lumOff val="35000"/>
-                  </a:schemeClr>
-                </a:solidFill>
-                <a:latin typeface="+mj-lt"/>
-              </a:rPr>
-              <a:t>Cats are similar in anatomy to the other fields, with a strong flexible body,  quick reflexes, sharp retractable claws,</a:t>
-            </a:r>
-            <a:r>
-              <a:rPr lang="ru-RU" dirty="0">
-                <a:solidFill>
-                  <a:schemeClr val="tx1">
-                    <a:lumMod val="65000"/>
-                    <a:lumOff val="35000"/>
-                  </a:schemeClr>
-                </a:solidFill>
-                <a:latin typeface="+mj-lt"/>
-              </a:rPr>
-              <a:t>  </a:t>
-            </a:r>
-            <a:r>
-              <a:rPr lang="en-US" dirty="0">
-                <a:solidFill>
-                  <a:schemeClr val="tx1">
-                    <a:lumMod val="65000"/>
-                    <a:lumOff val="35000"/>
-                  </a:schemeClr>
-                </a:solidFill>
-                <a:latin typeface="+mj-lt"/>
-              </a:rPr>
-              <a:t>and teeth adapted to killing small prey</a:t>
-            </a:r>
-          </a:p>
-        </p:txBody>
-      </p:sp>
-      <p:sp>
-        <p:nvSpPr>
-          <p:cNvPr id="9" name="TextBox 8"/>
-          <p:cNvSpPr txBox="1"/>
-          <p:nvPr/>
-        </p:nvSpPr>
-        <p:spPr>
-          <a:xfrm>
-            <a:off x="647701" y="255654"/>
-            <a:ext cx="558800" cy="600164"/>
-          </a:xfrm>
-          <a:prstGeom prst="rect">
-            <a:avLst/>
-          </a:prstGeom>
-          <a:noFill/>
-        </p:spPr>
-        <p:txBody>
-          <a:bodyPr wrap="square" rtlCol="0">
-            <a:spAutoFit/>
-          </a:bodyPr>
-          <a:lstStyle/>
-          <a:p>
-            <a:r>
-              <a:rPr lang="ru-RU" sz="3300" b="1" dirty="0">
+              <a:rPr lang="ru-RU" sz="2800" b="1" dirty="0" smtClean="0">
                 <a:solidFill>
                   <a:schemeClr val="accent1"/>
                 </a:solidFill>
-              </a:rPr>
-              <a:t>2</a:t>
-            </a:r>
-            <a:endParaRPr lang="en-US" sz="3300" b="1" dirty="0">
+                <a:latin typeface="Tahoma" charset="0"/>
+                <a:ea typeface="Tahoma" charset="0"/>
+                <a:cs typeface="Tahoma" charset="0"/>
+              </a:rPr>
+              <a:t>Разумные границы применимости  подхода</a:t>
+            </a:r>
+            <a:endParaRPr lang="en-US" sz="2800" b="1" dirty="0">
               <a:solidFill>
                 <a:schemeClr val="accent1"/>
               </a:solidFill>
+              <a:latin typeface="Tahoma" charset="0"/>
+              <a:ea typeface="Tahoma" charset="0"/>
+              <a:cs typeface="Tahoma" charset="0"/>
             </a:endParaRPr>
           </a:p>
         </p:txBody>
@@ -7680,7 +7939,7 @@
     </p:spTree>
     <p:extLst>
       <p:ext uri="{BB962C8B-B14F-4D97-AF65-F5344CB8AC3E}">
-        <p14:creationId xmlns:p14="http://schemas.microsoft.com/office/powerpoint/2010/main" val="1007371251"/>
+        <p14:creationId xmlns:p14="http://schemas.microsoft.com/office/powerpoint/2010/main" val="271638538"/>
       </p:ext>
     </p:extLst>
   </p:cSld>
@@ -7726,259 +7985,302 @@
         </p:nvSpPr>
         <p:spPr>
           <a:xfrm>
-            <a:off x="967440" y="567671"/>
-            <a:ext cx="7196850" cy="782189"/>
+            <a:off x="647700" y="1077898"/>
+            <a:ext cx="7568184" cy="541352"/>
           </a:xfrm>
         </p:spPr>
         <p:txBody>
           <a:bodyPr>
-            <a:noAutofit/>
+            <a:normAutofit fontScale="90000"/>
           </a:bodyPr>
           <a:lstStyle/>
           <a:p>
-            <a:pPr algn="r"/>
-            <a:r>
-              <a:rPr lang="ru-RU" sz="2400" dirty="0">
-                <a:ea typeface="Helvetica Neue" charset="0"/>
-                <a:cs typeface="Helvetica Neue" charset="0"/>
-              </a:rPr>
-              <a:t>Короткие семантически насыщенные тексты</a:t>
-            </a:r>
-            <a:endParaRPr lang="en-US" sz="2400" dirty="0">
-              <a:ea typeface="Helvetica Neue" charset="0"/>
-              <a:cs typeface="Helvetica Neue" charset="0"/>
-            </a:endParaRPr>
-          </a:p>
-        </p:txBody>
-      </p:sp>
-      <p:pic>
-        <p:nvPicPr>
-          <p:cNvPr id="4" name="officeArt object"/>
-          <p:cNvPicPr>
-            <a:picLocks noGrp="1"/>
-          </p:cNvPicPr>
+            <a:r>
+              <a:rPr lang="ru-RU" dirty="0" smtClean="0"/>
+              <a:t>Вывод</a:t>
+            </a:r>
+            <a:endParaRPr lang="en-US" dirty="0"/>
+          </a:p>
+        </p:txBody>
+      </p:sp>
+      <p:sp>
+        <p:nvSpPr>
+          <p:cNvPr id="3" name="Content Placeholder 2"/>
+          <p:cNvSpPr>
+            <a:spLocks noGrp="1"/>
+          </p:cNvSpPr>
           <p:nvPr>
             <p:ph idx="1"/>
           </p:nvPr>
-        </p:nvPicPr>
-        <p:blipFill>
-          <a:blip r:embed="rId2">
-            <a:extLst/>
-          </a:blip>
-          <a:stretch>
-            <a:fillRect/>
-          </a:stretch>
-        </p:blipFill>
+        </p:nvSpPr>
         <p:spPr>
           <a:xfrm>
-            <a:off x="4469758" y="1939804"/>
-            <a:ext cx="3694532" cy="4351338"/>
+            <a:off x="647700" y="1619250"/>
+            <a:ext cx="7670800" cy="3873103"/>
           </a:xfrm>
-          <a:prstGeom prst="rect">
-            <a:avLst/>
-          </a:prstGeom>
-          <a:ln w="12700" cap="flat">
-            <a:noFill/>
-            <a:miter lim="400000"/>
-          </a:ln>
-          <a:effectLst/>
         </p:spPr>
-      </p:pic>
-      <p:sp>
-        <p:nvSpPr>
-          <p:cNvPr id="6" name="TextBox 5"/>
-          <p:cNvSpPr txBox="1"/>
-          <p:nvPr/>
-        </p:nvSpPr>
-        <p:spPr>
-          <a:xfrm>
-            <a:off x="647701" y="1339699"/>
-            <a:ext cx="4303538" cy="761747"/>
-          </a:xfrm>
-          <a:prstGeom prst="rect">
-            <a:avLst/>
-          </a:prstGeom>
-          <a:noFill/>
-        </p:spPr>
-        <p:txBody>
-          <a:bodyPr wrap="square" rtlCol="0">
-            <a:spAutoFit/>
+        <p:txBody>
+          <a:bodyPr>
+            <a:normAutofit fontScale="92500"/>
           </a:bodyPr>
           <a:lstStyle/>
           <a:p>
-            <a:r>
-              <a:rPr lang="en-US" sz="1500" dirty="0">
-                <a:solidFill>
-                  <a:schemeClr val="tx1">
-                    <a:lumMod val="65000"/>
-                    <a:lumOff val="35000"/>
-                  </a:schemeClr>
-                </a:solidFill>
-                <a:latin typeface="+mj-lt"/>
-                <a:ea typeface="Helvetica Neue" charset="0"/>
-                <a:cs typeface="Helvetica Neue" charset="0"/>
-              </a:rPr>
-              <a:t>A Clock is a </a:t>
-            </a:r>
-            <a:r>
-              <a:rPr lang="en-US" sz="1500" dirty="0" err="1">
-                <a:solidFill>
-                  <a:schemeClr val="tx1">
-                    <a:lumMod val="65000"/>
-                    <a:lumOff val="35000"/>
-                  </a:schemeClr>
-                </a:solidFill>
-                <a:latin typeface="+mj-lt"/>
-                <a:ea typeface="Helvetica Neue" charset="0"/>
-                <a:cs typeface="Helvetica Neue" charset="0"/>
-              </a:rPr>
-              <a:t>TemporalInstrument</a:t>
-            </a:r>
-            <a:r>
-              <a:rPr lang="en-US" sz="1500" dirty="0">
-                <a:solidFill>
-                  <a:schemeClr val="tx1">
-                    <a:lumMod val="65000"/>
-                    <a:lumOff val="35000"/>
-                  </a:schemeClr>
-                </a:solidFill>
-                <a:latin typeface="+mj-lt"/>
-                <a:ea typeface="Helvetica Neue" charset="0"/>
-                <a:cs typeface="Helvetica Neue" charset="0"/>
-              </a:rPr>
-              <a:t> to </a:t>
-            </a:r>
-            <a:r>
-              <a:rPr lang="en-US" sz="1500" dirty="0" smtClean="0">
-                <a:solidFill>
-                  <a:schemeClr val="tx1">
-                    <a:lumMod val="65000"/>
-                    <a:lumOff val="35000"/>
-                  </a:schemeClr>
-                </a:solidFill>
-                <a:latin typeface="+mj-lt"/>
-                <a:ea typeface="Helvetica Neue" charset="0"/>
-                <a:cs typeface="Helvetica Neue" charset="0"/>
-              </a:rPr>
-              <a:t>generate </a:t>
-            </a:r>
-          </a:p>
-          <a:p>
-            <a:r>
-              <a:rPr lang="en-US" sz="1500" dirty="0" smtClean="0">
-                <a:solidFill>
-                  <a:schemeClr val="tx1">
-                    <a:lumMod val="65000"/>
-                    <a:lumOff val="35000"/>
-                  </a:schemeClr>
-                </a:solidFill>
-                <a:latin typeface="+mj-lt"/>
-                <a:ea typeface="Helvetica Neue" charset="0"/>
-                <a:cs typeface="Helvetica Neue" charset="0"/>
-              </a:rPr>
-              <a:t>the </a:t>
-            </a:r>
-            <a:r>
-              <a:rPr lang="en-US" sz="1500" dirty="0">
-                <a:solidFill>
-                  <a:schemeClr val="tx1">
-                    <a:lumMod val="65000"/>
-                    <a:lumOff val="35000"/>
-                  </a:schemeClr>
-                </a:solidFill>
-                <a:latin typeface="+mj-lt"/>
-                <a:ea typeface="Helvetica Neue" charset="0"/>
-                <a:cs typeface="Helvetica Neue" charset="0"/>
-              </a:rPr>
-              <a:t>instances of a </a:t>
-            </a:r>
-            <a:r>
-              <a:rPr lang="en-US" sz="1500" dirty="0" err="1">
-                <a:solidFill>
-                  <a:schemeClr val="tx1">
-                    <a:lumMod val="65000"/>
-                    <a:lumOff val="35000"/>
-                  </a:schemeClr>
-                </a:solidFill>
-                <a:latin typeface="+mj-lt"/>
-                <a:ea typeface="Helvetica Neue" charset="0"/>
-                <a:cs typeface="Helvetica Neue" charset="0"/>
-              </a:rPr>
-              <a:t>TemporalMeasure</a:t>
-            </a:r>
-            <a:r>
-              <a:rPr lang="en-US" sz="1500" dirty="0">
-                <a:solidFill>
-                  <a:schemeClr val="tx1">
-                    <a:lumMod val="65000"/>
-                    <a:lumOff val="35000"/>
-                  </a:schemeClr>
-                </a:solidFill>
-                <a:latin typeface="+mj-lt"/>
-                <a:ea typeface="Helvetica Neue" charset="0"/>
-                <a:cs typeface="Helvetica Neue" charset="0"/>
-              </a:rPr>
-              <a:t>. </a:t>
-            </a:r>
-            <a:endParaRPr lang="en-US" sz="1500" b="1" dirty="0">
-              <a:solidFill>
-                <a:schemeClr val="tx1">
-                  <a:lumMod val="65000"/>
-                  <a:lumOff val="35000"/>
-                </a:schemeClr>
-              </a:solidFill>
-              <a:latin typeface="+mj-lt"/>
-              <a:ea typeface="Helvetica Neue" charset="0"/>
-              <a:cs typeface="Helvetica Neue" charset="0"/>
-            </a:endParaRPr>
-          </a:p>
-          <a:p>
-            <a:endParaRPr lang="en-US" sz="1350" dirty="0"/>
-          </a:p>
-        </p:txBody>
-      </p:sp>
-      <p:sp>
-        <p:nvSpPr>
-          <p:cNvPr id="8" name="TextBox 7"/>
-          <p:cNvSpPr txBox="1"/>
-          <p:nvPr/>
-        </p:nvSpPr>
-        <p:spPr>
-          <a:xfrm>
-            <a:off x="647701" y="513862"/>
-            <a:ext cx="406400" cy="600164"/>
-          </a:xfrm>
-          <a:prstGeom prst="rect">
-            <a:avLst/>
-          </a:prstGeom>
-          <a:noFill/>
-        </p:spPr>
-        <p:txBody>
-          <a:bodyPr wrap="square" rtlCol="0">
-            <a:spAutoFit/>
-          </a:bodyPr>
-          <a:lstStyle/>
-          <a:p>
-            <a:r>
-              <a:rPr lang="ru-RU" sz="3300" b="1" dirty="0">
+            <a:pPr marL="0" indent="0" algn="just">
+              <a:buNone/>
+            </a:pPr>
+            <a:r>
+              <a:rPr lang="ru-RU" dirty="0" smtClean="0"/>
+              <a:t>	</a:t>
+            </a:r>
+            <a:r>
+              <a:rPr lang="ru-RU" sz="2100" dirty="0"/>
+              <a:t/>
+            </a:r>
+            <a:br>
+              <a:rPr lang="ru-RU" sz="2100" dirty="0"/>
+            </a:br>
+            <a:r>
+              <a:rPr lang="ru-RU" sz="2100" dirty="0"/>
+              <a:t>	П</a:t>
+            </a:r>
+            <a:r>
+              <a:rPr lang="en-US" sz="2100" dirty="0" err="1"/>
+              <a:t>рограмма</a:t>
+            </a:r>
+            <a:r>
+              <a:rPr lang="en-US" sz="2100" dirty="0"/>
+              <a:t> </a:t>
+            </a:r>
+            <a:r>
+              <a:rPr lang="en-US" sz="2100" dirty="0" err="1"/>
+              <a:t>парсер</a:t>
+            </a:r>
+            <a:r>
+              <a:rPr lang="en-US" sz="2100" dirty="0"/>
+              <a:t> </a:t>
+            </a:r>
+            <a:r>
+              <a:rPr lang="en-US" sz="2100" dirty="0" err="1"/>
+              <a:t>выполняет</a:t>
+            </a:r>
+            <a:r>
+              <a:rPr lang="en-US" sz="2100" dirty="0"/>
+              <a:t> </a:t>
+            </a:r>
+            <a:r>
+              <a:rPr lang="en-US" sz="2100" dirty="0" err="1"/>
+              <a:t>базовые</a:t>
+            </a:r>
+            <a:r>
+              <a:rPr lang="en-US" sz="2100" dirty="0"/>
+              <a:t> </a:t>
+            </a:r>
+            <a:r>
+              <a:rPr lang="en-US" sz="2100" dirty="0" err="1"/>
+              <a:t>функции</a:t>
+            </a:r>
+            <a:r>
+              <a:rPr lang="en-US" sz="2100" dirty="0"/>
+              <a:t> </a:t>
+            </a:r>
+            <a:r>
+              <a:rPr lang="en-US" sz="2100" dirty="0" err="1"/>
+              <a:t>конвертации</a:t>
+            </a:r>
+            <a:r>
+              <a:rPr lang="en-US" sz="2100" dirty="0"/>
+              <a:t> </a:t>
+            </a:r>
+            <a:r>
+              <a:rPr lang="en-US" sz="2100" dirty="0" err="1"/>
+              <a:t>текста</a:t>
+            </a:r>
+            <a:r>
+              <a:rPr lang="en-US" sz="2100" dirty="0"/>
+              <a:t> </a:t>
+            </a:r>
+            <a:r>
+              <a:rPr lang="en-US" sz="2100" dirty="0" err="1"/>
+              <a:t>на</a:t>
+            </a:r>
+            <a:r>
+              <a:rPr lang="en-US" sz="2100" dirty="0"/>
+              <a:t> </a:t>
+            </a:r>
+            <a:r>
+              <a:rPr lang="en-US" sz="2100" dirty="0" err="1"/>
+              <a:t>естественном</a:t>
+            </a:r>
+            <a:r>
+              <a:rPr lang="en-US" sz="2100" dirty="0"/>
+              <a:t> </a:t>
+            </a:r>
+            <a:r>
+              <a:rPr lang="en-US" sz="2100" dirty="0" err="1"/>
+              <a:t>языке</a:t>
+            </a:r>
+            <a:r>
+              <a:rPr lang="en-US" sz="2100" dirty="0"/>
+              <a:t> </a:t>
+            </a:r>
+            <a:r>
+              <a:rPr lang="en-US" sz="2100" dirty="0" err="1"/>
+              <a:t>в</a:t>
+            </a:r>
+            <a:r>
+              <a:rPr lang="en-US" sz="2100" dirty="0"/>
+              <a:t> UML </a:t>
+            </a:r>
+            <a:r>
+              <a:rPr lang="en-US" sz="2100" dirty="0" err="1"/>
+              <a:t>диаграммы</a:t>
+            </a:r>
+            <a:r>
+              <a:rPr lang="en-US" sz="2100" dirty="0"/>
+              <a:t> </a:t>
+            </a:r>
+            <a:r>
+              <a:rPr lang="en-US" sz="2100" dirty="0" err="1"/>
+              <a:t>согласно</a:t>
+            </a:r>
+            <a:r>
+              <a:rPr lang="en-US" sz="2100" dirty="0"/>
+              <a:t> </a:t>
+            </a:r>
+            <a:r>
+              <a:rPr lang="ru-RU" sz="2100" dirty="0"/>
+              <a:t>разработанным </a:t>
+            </a:r>
+            <a:r>
+              <a:rPr lang="en-US" sz="2100" dirty="0" err="1"/>
+              <a:t>правилам</a:t>
+            </a:r>
+            <a:r>
+              <a:rPr lang="ru-RU" sz="2100" dirty="0"/>
+              <a:t>, однако </a:t>
+            </a:r>
+            <a:r>
+              <a:rPr lang="en-US" sz="2100" dirty="0" err="1"/>
+              <a:t>успешность</a:t>
+            </a:r>
+            <a:r>
+              <a:rPr lang="en-US" sz="2100" dirty="0"/>
+              <a:t> </a:t>
+            </a:r>
+            <a:r>
+              <a:rPr lang="en-US" sz="2100" dirty="0" err="1"/>
+              <a:t>конвертации</a:t>
+            </a:r>
+            <a:r>
+              <a:rPr lang="en-US" sz="2100" dirty="0"/>
+              <a:t> </a:t>
+            </a:r>
+            <a:r>
+              <a:rPr lang="en-US" sz="2100" dirty="0" err="1"/>
+              <a:t>зависит</a:t>
+            </a:r>
+            <a:r>
+              <a:rPr lang="en-US" sz="2100" dirty="0"/>
+              <a:t> </a:t>
+            </a:r>
+            <a:r>
+              <a:rPr lang="en-US" sz="2100" dirty="0" err="1"/>
+              <a:t>от</a:t>
+            </a:r>
+            <a:r>
+              <a:rPr lang="en-US" sz="2100" dirty="0"/>
+              <a:t> </a:t>
+            </a:r>
+            <a:r>
+              <a:rPr lang="en-US" sz="2100" dirty="0" err="1"/>
+              <a:t>многих</a:t>
+            </a:r>
+            <a:r>
+              <a:rPr lang="en-US" sz="2100" dirty="0"/>
+              <a:t> </a:t>
+            </a:r>
+            <a:r>
+              <a:rPr lang="en-US" sz="2100" dirty="0" err="1"/>
+              <a:t>факторов</a:t>
+            </a:r>
+            <a:r>
+              <a:rPr lang="ru-RU" sz="2100" dirty="0"/>
+              <a:t>: </a:t>
+            </a:r>
+          </a:p>
+          <a:p>
+            <a:pPr marL="0" indent="0" algn="just">
+              <a:buNone/>
+            </a:pPr>
+            <a:endParaRPr lang="ru-RU" sz="2100" dirty="0"/>
+          </a:p>
+          <a:p>
+            <a:pPr>
+              <a:buFontTx/>
+              <a:buChar char="-"/>
+            </a:pPr>
+            <a:r>
+              <a:rPr lang="ru-RU" sz="2100" dirty="0"/>
+              <a:t>объем текста;</a:t>
+            </a:r>
+          </a:p>
+          <a:p>
+            <a:pPr>
+              <a:buFontTx/>
+              <a:buChar char="-"/>
+            </a:pPr>
+            <a:r>
+              <a:rPr lang="ru-RU" sz="2100" dirty="0"/>
+              <a:t>его корректность с точки зрения орфографии и семантики; </a:t>
+            </a:r>
+          </a:p>
+          <a:p>
+            <a:pPr>
+              <a:buFontTx/>
+              <a:buChar char="-"/>
+            </a:pPr>
+            <a:r>
+              <a:rPr lang="ru-RU" sz="2100" dirty="0"/>
+              <a:t>результаты </a:t>
+            </a:r>
+            <a:r>
+              <a:rPr lang="ru-RU" sz="2100" dirty="0" err="1"/>
+              <a:t>парсинга</a:t>
+            </a:r>
+            <a:r>
+              <a:rPr lang="ru-RU" sz="2100" dirty="0"/>
+              <a:t> </a:t>
+            </a:r>
+            <a:r>
+              <a:rPr lang="en-US" sz="2100" dirty="0"/>
+              <a:t>Stanford Core NLP;</a:t>
+            </a:r>
+            <a:endParaRPr lang="ru-RU" sz="2100" dirty="0"/>
+          </a:p>
+          <a:p>
+            <a:pPr marL="0" indent="0">
+              <a:buNone/>
+            </a:pPr>
+            <a:r>
+              <a:rPr lang="ru-RU" sz="2100" dirty="0">
                 <a:solidFill>
                   <a:schemeClr val="accent1"/>
                 </a:solidFill>
               </a:rPr>
-              <a:t>3</a:t>
-            </a:r>
-            <a:endParaRPr lang="en-US" sz="3300" b="1" dirty="0">
-              <a:solidFill>
-                <a:schemeClr val="accent1"/>
-              </a:solidFill>
-            </a:endParaRPr>
+              <a:t>-</a:t>
+            </a:r>
+            <a:r>
+              <a:rPr lang="ru-RU" sz="2100" dirty="0"/>
+              <a:t> корректность правил конвертации.</a:t>
+            </a:r>
+            <a:endParaRPr lang="en-US" sz="2100" dirty="0"/>
           </a:p>
         </p:txBody>
       </p:sp>
     </p:spTree>
     <p:extLst>
       <p:ext uri="{BB962C8B-B14F-4D97-AF65-F5344CB8AC3E}">
-        <p14:creationId xmlns:p14="http://schemas.microsoft.com/office/powerpoint/2010/main" val="1887480677"/>
+        <p14:creationId xmlns:p14="http://schemas.microsoft.com/office/powerpoint/2010/main" val="1909838834"/>
       </p:ext>
     </p:extLst>
   </p:cSld>

</xml_diff>

<commit_message>
Add borders if use screen
</commit_message>
<xml_diff>
--- a/presentation/Moiseyenko_presentation_cut.pptx
+++ b/presentation/Moiseyenko_presentation_cut.pptx
@@ -9073,39 +9073,6 @@
           <a:chExt cx="0" cy="0"/>
         </a:xfrm>
       </p:grpSpPr>
-      <p:pic>
-        <p:nvPicPr>
-          <p:cNvPr id="4" name="officeArt object"/>
-          <p:cNvPicPr>
-            <a:picLocks noGrp="1"/>
-          </p:cNvPicPr>
-          <p:nvPr>
-            <p:ph idx="1"/>
-          </p:nvPr>
-        </p:nvPicPr>
-        <p:blipFill>
-          <a:blip r:embed="rId2">
-            <a:extLst/>
-          </a:blip>
-          <a:stretch>
-            <a:fillRect/>
-          </a:stretch>
-        </p:blipFill>
-        <p:spPr>
-          <a:xfrm>
-            <a:off x="946150" y="2136302"/>
-            <a:ext cx="6446838" cy="3653208"/>
-          </a:xfrm>
-          <a:prstGeom prst="rect">
-            <a:avLst/>
-          </a:prstGeom>
-          <a:ln w="12700" cap="flat">
-            <a:noFill/>
-            <a:miter lim="400000"/>
-          </a:ln>
-          <a:effectLst/>
-        </p:spPr>
-      </p:pic>
       <p:sp>
         <p:nvSpPr>
           <p:cNvPr id="5" name="TextBox 4"/>
@@ -9150,6 +9117,36 @@
           </a:p>
         </p:txBody>
       </p:sp>
+      <p:pic>
+        <p:nvPicPr>
+          <p:cNvPr id="7" name="Picture 6"/>
+          <p:cNvPicPr>
+            <a:picLocks noChangeAspect="1"/>
+          </p:cNvPicPr>
+          <p:nvPr/>
+        </p:nvPicPr>
+        <p:blipFill>
+          <a:blip r:embed="rId2">
+            <a:extLst>
+              <a:ext uri="{28A0092B-C50C-407E-A947-70E740481C1C}">
+                <a14:useLocalDpi xmlns:a14="http://schemas.microsoft.com/office/drawing/2010/main" val="0"/>
+              </a:ext>
+            </a:extLst>
+          </a:blip>
+          <a:stretch>
+            <a:fillRect/>
+          </a:stretch>
+        </p:blipFill>
+        <p:spPr>
+          <a:xfrm>
+            <a:off x="585158" y="1497447"/>
+            <a:ext cx="7645477" cy="4473864"/>
+          </a:xfrm>
+          <a:prstGeom prst="rect">
+            <a:avLst/>
+          </a:prstGeom>
+        </p:spPr>
+      </p:pic>
     </p:spTree>
     <p:extLst>
       <p:ext uri="{BB962C8B-B14F-4D97-AF65-F5344CB8AC3E}">

</xml_diff>